<commit_message>
Added password retrieval page
</commit_message>
<xml_diff>
--- a/Sketches/Prototype/Prototype1/Prototype1.pptx
+++ b/Sketches/Prototype/Prototype1/Prototype1.pptx
@@ -13,14 +13,15 @@
     <p:sldId id="275" r:id="rId7"/>
     <p:sldId id="277" r:id="rId8"/>
     <p:sldId id="278" r:id="rId9"/>
-    <p:sldId id="276" r:id="rId10"/>
-    <p:sldId id="279" r:id="rId11"/>
-    <p:sldId id="280" r:id="rId12"/>
-    <p:sldId id="281" r:id="rId13"/>
-    <p:sldId id="282" r:id="rId14"/>
-    <p:sldId id="283" r:id="rId15"/>
-    <p:sldId id="284" r:id="rId16"/>
-    <p:sldId id="286" r:id="rId17"/>
+    <p:sldId id="287" r:id="rId10"/>
+    <p:sldId id="276" r:id="rId11"/>
+    <p:sldId id="279" r:id="rId12"/>
+    <p:sldId id="280" r:id="rId13"/>
+    <p:sldId id="281" r:id="rId14"/>
+    <p:sldId id="282" r:id="rId15"/>
+    <p:sldId id="283" r:id="rId16"/>
+    <p:sldId id="284" r:id="rId17"/>
+    <p:sldId id="286" r:id="rId18"/>
   </p:sldIdLst>
   <p:sldSz cx="12192000" cy="6858000"/>
   <p:notesSz cx="6858000" cy="9144000"/>
@@ -119,6 +120,11 @@
       </a:defRPr>
     </a:lvl9pPr>
   </p:defaultTextStyle>
+  <p:extLst>
+    <p:ext uri="{EFAFB233-063F-42B5-8137-9DF3F51BA10A}">
+      <p15:sldGuideLst xmlns:p15="http://schemas.microsoft.com/office/powerpoint/2012/main"/>
+    </p:ext>
+  </p:extLst>
 </p:presentation>
 </file>
 
@@ -587,7 +593,7 @@
           </ac:graphicFrameMkLst>
         </pc:graphicFrameChg>
         <pc:graphicFrameChg chg="add mod modGraphic">
-          <ac:chgData name="Wu Yue" userId="19b23c7f814c92e1" providerId="LiveId" clId="{4A1D471B-26C4-4400-B6D5-49CB927B9C37}" dt="2018-04-17T20:52:20.166" v="267"/>
+          <ac:chgData name="Wu Yue" userId="19b23c7f814c92e1" providerId="LiveId" clId="{4A1D471B-26C4-4400-B6D5-49CB927B9C37}" dt="2018-04-17T20:52:20.166" v="267" actId="2696"/>
           <ac:graphicFrameMkLst>
             <pc:docMk/>
             <pc:sldMk cId="610425213" sldId="264"/>
@@ -1068,7 +1074,7 @@
           <pc:sldMk cId="1995397135" sldId="267"/>
         </pc:sldMkLst>
         <pc:spChg chg="add">
-          <ac:chgData name="Wu Yue" userId="19b23c7f814c92e1" providerId="LiveId" clId="{4A1D471B-26C4-4400-B6D5-49CB927B9C37}" dt="2018-04-17T20:55:04.375" v="314"/>
+          <ac:chgData name="Wu Yue" userId="19b23c7f814c92e1" providerId="LiveId" clId="{4A1D471B-26C4-4400-B6D5-49CB927B9C37}" dt="2018-04-17T20:55:04.375" v="314" actId="2696"/>
           <ac:spMkLst>
             <pc:docMk/>
             <pc:sldMk cId="1995397135" sldId="267"/>
@@ -1083,7 +1089,7 @@
           <pc:sldMk cId="522583700" sldId="268"/>
         </pc:sldMkLst>
         <pc:spChg chg="add">
-          <ac:chgData name="Wu Yue" userId="19b23c7f814c92e1" providerId="LiveId" clId="{4A1D471B-26C4-4400-B6D5-49CB927B9C37}" dt="2018-04-17T20:55:04.930" v="315"/>
+          <ac:chgData name="Wu Yue" userId="19b23c7f814c92e1" providerId="LiveId" clId="{4A1D471B-26C4-4400-B6D5-49CB927B9C37}" dt="2018-04-17T20:55:04.930" v="315" actId="2696"/>
           <ac:spMkLst>
             <pc:docMk/>
             <pc:sldMk cId="522583700" sldId="268"/>
@@ -1098,7 +1104,7 @@
           <pc:sldMk cId="2969261228" sldId="269"/>
         </pc:sldMkLst>
         <pc:spChg chg="add">
-          <ac:chgData name="Wu Yue" userId="19b23c7f814c92e1" providerId="LiveId" clId="{4A1D471B-26C4-4400-B6D5-49CB927B9C37}" dt="2018-04-17T20:55:05.836" v="316"/>
+          <ac:chgData name="Wu Yue" userId="19b23c7f814c92e1" providerId="LiveId" clId="{4A1D471B-26C4-4400-B6D5-49CB927B9C37}" dt="2018-04-17T20:55:05.836" v="316" actId="2696"/>
           <ac:spMkLst>
             <pc:docMk/>
             <pc:sldMk cId="2969261228" sldId="269"/>
@@ -1113,7 +1119,7 @@
           <pc:sldMk cId="3470340673" sldId="270"/>
         </pc:sldMkLst>
         <pc:spChg chg="add">
-          <ac:chgData name="Wu Yue" userId="19b23c7f814c92e1" providerId="LiveId" clId="{4A1D471B-26C4-4400-B6D5-49CB927B9C37}" dt="2018-04-17T20:55:06.616" v="317"/>
+          <ac:chgData name="Wu Yue" userId="19b23c7f814c92e1" providerId="LiveId" clId="{4A1D471B-26C4-4400-B6D5-49CB927B9C37}" dt="2018-04-17T20:55:06.616" v="317" actId="2696"/>
           <ac:spMkLst>
             <pc:docMk/>
             <pc:sldMk cId="3470340673" sldId="270"/>
@@ -1128,7 +1134,7 @@
           <pc:sldMk cId="3815757576" sldId="271"/>
         </pc:sldMkLst>
         <pc:spChg chg="add">
-          <ac:chgData name="Wu Yue" userId="19b23c7f814c92e1" providerId="LiveId" clId="{4A1D471B-26C4-4400-B6D5-49CB927B9C37}" dt="2018-04-17T20:55:07.452" v="318"/>
+          <ac:chgData name="Wu Yue" userId="19b23c7f814c92e1" providerId="LiveId" clId="{4A1D471B-26C4-4400-B6D5-49CB927B9C37}" dt="2018-04-17T20:55:07.452" v="318" actId="2696"/>
           <ac:spMkLst>
             <pc:docMk/>
             <pc:sldMk cId="3815757576" sldId="271"/>
@@ -1143,7 +1149,7 @@
           <pc:sldMk cId="1173813553" sldId="272"/>
         </pc:sldMkLst>
         <pc:spChg chg="add">
-          <ac:chgData name="Wu Yue" userId="19b23c7f814c92e1" providerId="LiveId" clId="{4A1D471B-26C4-4400-B6D5-49CB927B9C37}" dt="2018-04-17T20:55:08.249" v="319"/>
+          <ac:chgData name="Wu Yue" userId="19b23c7f814c92e1" providerId="LiveId" clId="{4A1D471B-26C4-4400-B6D5-49CB927B9C37}" dt="2018-04-17T20:55:08.249" v="319" actId="2696"/>
           <ac:spMkLst>
             <pc:docMk/>
             <pc:sldMk cId="1173813553" sldId="272"/>
@@ -1158,7 +1164,7 @@
           <pc:sldMk cId="2465517973" sldId="273"/>
         </pc:sldMkLst>
         <pc:spChg chg="add del">
-          <ac:chgData name="Wu Yue" userId="19b23c7f814c92e1" providerId="LiveId" clId="{4A1D471B-26C4-4400-B6D5-49CB927B9C37}" dt="2018-04-17T20:55:29.087" v="326"/>
+          <ac:chgData name="Wu Yue" userId="19b23c7f814c92e1" providerId="LiveId" clId="{4A1D471B-26C4-4400-B6D5-49CB927B9C37}" dt="2018-04-17T20:55:29.087" v="326" actId="2696"/>
           <ac:spMkLst>
             <pc:docMk/>
             <pc:sldMk cId="2465517973" sldId="273"/>
@@ -1166,7 +1172,7 @@
           </ac:spMkLst>
         </pc:spChg>
         <pc:spChg chg="add">
-          <ac:chgData name="Wu Yue" userId="19b23c7f814c92e1" providerId="LiveId" clId="{4A1D471B-26C4-4400-B6D5-49CB927B9C37}" dt="2018-04-17T20:55:30.746" v="327"/>
+          <ac:chgData name="Wu Yue" userId="19b23c7f814c92e1" providerId="LiveId" clId="{4A1D471B-26C4-4400-B6D5-49CB927B9C37}" dt="2018-04-17T20:55:30.746" v="327" actId="2696"/>
           <ac:spMkLst>
             <pc:docMk/>
             <pc:sldMk cId="2465517973" sldId="273"/>
@@ -1196,7 +1202,7 @@
           </ac:spMkLst>
         </pc:spChg>
         <pc:spChg chg="add">
-          <ac:chgData name="Wu Yue" userId="19b23c7f814c92e1" providerId="LiveId" clId="{4A1D471B-26C4-4400-B6D5-49CB927B9C37}" dt="2018-04-17T21:24:59.815" v="931"/>
+          <ac:chgData name="Wu Yue" userId="19b23c7f814c92e1" providerId="LiveId" clId="{4A1D471B-26C4-4400-B6D5-49CB927B9C37}" dt="2018-04-17T21:24:59.815" v="931" actId="20577"/>
           <ac:spMkLst>
             <pc:docMk/>
             <pc:sldMk cId="3139420482" sldId="274"/>
@@ -1204,7 +1210,7 @@
           </ac:spMkLst>
         </pc:spChg>
         <pc:spChg chg="add">
-          <ac:chgData name="Wu Yue" userId="19b23c7f814c92e1" providerId="LiveId" clId="{4A1D471B-26C4-4400-B6D5-49CB927B9C37}" dt="2018-04-17T21:24:59.815" v="931"/>
+          <ac:chgData name="Wu Yue" userId="19b23c7f814c92e1" providerId="LiveId" clId="{4A1D471B-26C4-4400-B6D5-49CB927B9C37}" dt="2018-04-17T21:24:59.815" v="931" actId="20577"/>
           <ac:spMkLst>
             <pc:docMk/>
             <pc:sldMk cId="3139420482" sldId="274"/>
@@ -1220,7 +1226,7 @@
           </ac:spMkLst>
         </pc:spChg>
         <pc:spChg chg="add">
-          <ac:chgData name="Wu Yue" userId="19b23c7f814c92e1" providerId="LiveId" clId="{4A1D471B-26C4-4400-B6D5-49CB927B9C37}" dt="2018-04-17T21:24:59.815" v="931"/>
+          <ac:chgData name="Wu Yue" userId="19b23c7f814c92e1" providerId="LiveId" clId="{4A1D471B-26C4-4400-B6D5-49CB927B9C37}" dt="2018-04-17T21:24:59.815" v="931" actId="20577"/>
           <ac:spMkLst>
             <pc:docMk/>
             <pc:sldMk cId="3139420482" sldId="274"/>
@@ -1228,7 +1234,7 @@
           </ac:spMkLst>
         </pc:spChg>
         <pc:spChg chg="add">
-          <ac:chgData name="Wu Yue" userId="19b23c7f814c92e1" providerId="LiveId" clId="{4A1D471B-26C4-4400-B6D5-49CB927B9C37}" dt="2018-04-17T21:24:59.815" v="931"/>
+          <ac:chgData name="Wu Yue" userId="19b23c7f814c92e1" providerId="LiveId" clId="{4A1D471B-26C4-4400-B6D5-49CB927B9C37}" dt="2018-04-17T21:24:59.815" v="931" actId="20577"/>
           <ac:spMkLst>
             <pc:docMk/>
             <pc:sldMk cId="3139420482" sldId="274"/>
@@ -1284,7 +1290,7 @@
           </ac:spMkLst>
         </pc:spChg>
         <pc:graphicFrameChg chg="mod modGraphic">
-          <ac:chgData name="Wu Yue" userId="19b23c7f814c92e1" providerId="LiveId" clId="{4A1D471B-26C4-4400-B6D5-49CB927B9C37}" dt="2018-04-17T21:03:00.514" v="522"/>
+          <ac:chgData name="Wu Yue" userId="19b23c7f814c92e1" providerId="LiveId" clId="{4A1D471B-26C4-4400-B6D5-49CB927B9C37}" dt="2018-04-17T21:03:00.514" v="522" actId="20577"/>
           <ac:graphicFrameMkLst>
             <pc:docMk/>
             <pc:sldMk cId="3139420482" sldId="274"/>
@@ -1854,7 +1860,7 @@
           </ac:spMkLst>
         </pc:spChg>
         <pc:spChg chg="add del">
-          <ac:chgData name="Wu Yue" userId="19b23c7f814c92e1" providerId="LiveId" clId="{4A1D471B-26C4-4400-B6D5-49CB927B9C37}" dt="2018-04-17T21:46:19.648" v="1588"/>
+          <ac:chgData name="Wu Yue" userId="19b23c7f814c92e1" providerId="LiveId" clId="{4A1D471B-26C4-4400-B6D5-49CB927B9C37}" dt="2018-04-17T21:46:19.648" v="1588" actId="1076"/>
           <ac:spMkLst>
             <pc:docMk/>
             <pc:sldMk cId="753135198" sldId="279"/>
@@ -7708,6 +7714,2226 @@
           <a:chExt cx="0" cy="0"/>
         </a:xfrm>
       </p:grpSpPr>
+      <p:graphicFrame>
+        <p:nvGraphicFramePr>
+          <p:cNvPr id="56" name="Table 55">
+            <a:extLst>
+              <a:ext uri="{FF2B5EF4-FFF2-40B4-BE49-F238E27FC236}">
+                <a16:creationId xmlns:a16="http://schemas.microsoft.com/office/drawing/2014/main" id="{57835D6E-6815-41BE-8F17-C908999B7AFB}"/>
+              </a:ext>
+            </a:extLst>
+          </p:cNvPr>
+          <p:cNvGraphicFramePr>
+            <a:graphicFrameLocks noGrp="1"/>
+          </p:cNvGraphicFramePr>
+          <p:nvPr/>
+        </p:nvGraphicFramePr>
+        <p:xfrm>
+          <a:off x="0" y="1055226"/>
+          <a:ext cx="12191998" cy="555460"/>
+        </p:xfrm>
+        <a:graphic>
+          <a:graphicData uri="http://schemas.openxmlformats.org/drawingml/2006/table">
+            <a:tbl>
+              <a:tblPr firstRow="1" bandRow="1">
+                <a:tableStyleId>{5C22544A-7EE6-4342-B048-85BDC9FD1C3A}</a:tableStyleId>
+              </a:tblPr>
+              <a:tblGrid>
+                <a:gridCol w="1741714">
+                  <a:extLst>
+                    <a:ext uri="{9D8B030D-6E8A-4147-A177-3AD203B41FA5}">
+                      <a16:colId xmlns:a16="http://schemas.microsoft.com/office/drawing/2014/main" val="2931865132"/>
+                    </a:ext>
+                  </a:extLst>
+                </a:gridCol>
+                <a:gridCol w="1741714">
+                  <a:extLst>
+                    <a:ext uri="{9D8B030D-6E8A-4147-A177-3AD203B41FA5}">
+                      <a16:colId xmlns:a16="http://schemas.microsoft.com/office/drawing/2014/main" val="1520592850"/>
+                    </a:ext>
+                  </a:extLst>
+                </a:gridCol>
+                <a:gridCol w="1741714">
+                  <a:extLst>
+                    <a:ext uri="{9D8B030D-6E8A-4147-A177-3AD203B41FA5}">
+                      <a16:colId xmlns:a16="http://schemas.microsoft.com/office/drawing/2014/main" val="1937029407"/>
+                    </a:ext>
+                  </a:extLst>
+                </a:gridCol>
+                <a:gridCol w="1741714">
+                  <a:extLst>
+                    <a:ext uri="{9D8B030D-6E8A-4147-A177-3AD203B41FA5}">
+                      <a16:colId xmlns:a16="http://schemas.microsoft.com/office/drawing/2014/main" val="4117769092"/>
+                    </a:ext>
+                  </a:extLst>
+                </a:gridCol>
+                <a:gridCol w="1741714">
+                  <a:extLst>
+                    <a:ext uri="{9D8B030D-6E8A-4147-A177-3AD203B41FA5}">
+                      <a16:colId xmlns:a16="http://schemas.microsoft.com/office/drawing/2014/main" val="2770334083"/>
+                    </a:ext>
+                  </a:extLst>
+                </a:gridCol>
+                <a:gridCol w="1741714">
+                  <a:extLst>
+                    <a:ext uri="{9D8B030D-6E8A-4147-A177-3AD203B41FA5}">
+                      <a16:colId xmlns:a16="http://schemas.microsoft.com/office/drawing/2014/main" val="1558791370"/>
+                    </a:ext>
+                  </a:extLst>
+                </a:gridCol>
+                <a:gridCol w="1741714">
+                  <a:extLst>
+                    <a:ext uri="{9D8B030D-6E8A-4147-A177-3AD203B41FA5}">
+                      <a16:colId xmlns:a16="http://schemas.microsoft.com/office/drawing/2014/main" val="51519993"/>
+                    </a:ext>
+                  </a:extLst>
+                </a:gridCol>
+              </a:tblGrid>
+              <a:tr h="555460">
+                <a:tc>
+                  <a:txBody>
+                    <a:bodyPr/>
+                    <a:lstStyle/>
+                    <a:p>
+                      <a:pPr algn="r"/>
+                      <a:r>
+                        <a:rPr lang="en-US" sz="1600" dirty="0">
+                          <a:solidFill>
+                            <a:schemeClr val="tx1"/>
+                          </a:solidFill>
+                        </a:rPr>
+                        <a:t>Spanish</a:t>
+                      </a:r>
+                    </a:p>
+                  </a:txBody>
+                  <a:tcPr marL="136963" marR="136963" marT="68481" marB="68481" anchor="ctr">
+                    <a:lnT w="12700" cap="flat" cmpd="sng" algn="ctr">
+                      <a:solidFill>
+                        <a:schemeClr val="accent1"/>
+                      </a:solidFill>
+                      <a:prstDash val="solid"/>
+                      <a:round/>
+                      <a:headEnd type="none" w="med" len="med"/>
+                      <a:tailEnd type="none" w="med" len="med"/>
+                    </a:lnT>
+                    <a:lnB w="12700" cap="flat" cmpd="sng" algn="ctr">
+                      <a:noFill/>
+                      <a:prstDash val="solid"/>
+                      <a:round/>
+                      <a:headEnd type="none" w="med" len="med"/>
+                      <a:tailEnd type="none" w="med" len="med"/>
+                    </a:lnB>
+                    <a:solidFill>
+                      <a:schemeClr val="bg1"/>
+                    </a:solidFill>
+                  </a:tcPr>
+                </a:tc>
+                <a:tc>
+                  <a:txBody>
+                    <a:bodyPr/>
+                    <a:lstStyle/>
+                    <a:p>
+                      <a:pPr algn="r"/>
+                      <a:r>
+                        <a:rPr lang="en-US" sz="1600" dirty="0">
+                          <a:solidFill>
+                            <a:schemeClr val="tx1"/>
+                          </a:solidFill>
+                        </a:rPr>
+                        <a:t>French</a:t>
+                      </a:r>
+                    </a:p>
+                  </a:txBody>
+                  <a:tcPr marL="136963" marR="136963" marT="68481" marB="68481" anchor="ctr">
+                    <a:lnT w="12700" cap="flat" cmpd="sng" algn="ctr">
+                      <a:solidFill>
+                        <a:schemeClr val="accent1"/>
+                      </a:solidFill>
+                      <a:prstDash val="solid"/>
+                      <a:round/>
+                      <a:headEnd type="none" w="med" len="med"/>
+                      <a:tailEnd type="none" w="med" len="med"/>
+                    </a:lnT>
+                    <a:lnB w="12700" cap="flat" cmpd="sng" algn="ctr">
+                      <a:solidFill>
+                        <a:schemeClr val="accent1"/>
+                      </a:solidFill>
+                      <a:prstDash val="solid"/>
+                      <a:round/>
+                      <a:headEnd type="none" w="med" len="med"/>
+                      <a:tailEnd type="none" w="med" len="med"/>
+                    </a:lnB>
+                    <a:solidFill>
+                      <a:schemeClr val="accent1">
+                        <a:lumMod val="40000"/>
+                        <a:lumOff val="60000"/>
+                      </a:schemeClr>
+                    </a:solidFill>
+                  </a:tcPr>
+                </a:tc>
+                <a:tc>
+                  <a:txBody>
+                    <a:bodyPr/>
+                    <a:lstStyle/>
+                    <a:p>
+                      <a:pPr algn="r"/>
+                      <a:r>
+                        <a:rPr lang="en-US" sz="1600" dirty="0">
+                          <a:solidFill>
+                            <a:schemeClr val="tx1"/>
+                          </a:solidFill>
+                        </a:rPr>
+                        <a:t>Italian</a:t>
+                      </a:r>
+                    </a:p>
+                  </a:txBody>
+                  <a:tcPr marL="136963" marR="136963" marT="68481" marB="68481" anchor="ctr">
+                    <a:lnT w="12700" cap="flat" cmpd="sng" algn="ctr">
+                      <a:solidFill>
+                        <a:schemeClr val="accent1"/>
+                      </a:solidFill>
+                      <a:prstDash val="solid"/>
+                      <a:round/>
+                      <a:headEnd type="none" w="med" len="med"/>
+                      <a:tailEnd type="none" w="med" len="med"/>
+                    </a:lnT>
+                    <a:lnB w="12700" cap="flat" cmpd="sng" algn="ctr">
+                      <a:solidFill>
+                        <a:schemeClr val="accent1"/>
+                      </a:solidFill>
+                      <a:prstDash val="solid"/>
+                      <a:round/>
+                      <a:headEnd type="none" w="med" len="med"/>
+                      <a:tailEnd type="none" w="med" len="med"/>
+                    </a:lnB>
+                    <a:solidFill>
+                      <a:schemeClr val="accent1">
+                        <a:lumMod val="40000"/>
+                        <a:lumOff val="60000"/>
+                      </a:schemeClr>
+                    </a:solidFill>
+                  </a:tcPr>
+                </a:tc>
+                <a:tc>
+                  <a:txBody>
+                    <a:bodyPr/>
+                    <a:lstStyle/>
+                    <a:p>
+                      <a:pPr algn="r"/>
+                      <a:r>
+                        <a:rPr lang="en-US" sz="1600" dirty="0">
+                          <a:solidFill>
+                            <a:schemeClr val="tx1"/>
+                          </a:solidFill>
+                        </a:rPr>
+                        <a:t>Japanese</a:t>
+                      </a:r>
+                    </a:p>
+                  </a:txBody>
+                  <a:tcPr marL="136963" marR="136963" marT="68481" marB="68481" anchor="ctr">
+                    <a:lnT w="12700" cap="flat" cmpd="sng" algn="ctr">
+                      <a:solidFill>
+                        <a:schemeClr val="accent1"/>
+                      </a:solidFill>
+                      <a:prstDash val="solid"/>
+                      <a:round/>
+                      <a:headEnd type="none" w="med" len="med"/>
+                      <a:tailEnd type="none" w="med" len="med"/>
+                    </a:lnT>
+                    <a:lnB w="12700" cap="flat" cmpd="sng" algn="ctr">
+                      <a:solidFill>
+                        <a:schemeClr val="accent1"/>
+                      </a:solidFill>
+                      <a:prstDash val="solid"/>
+                      <a:round/>
+                      <a:headEnd type="none" w="med" len="med"/>
+                      <a:tailEnd type="none" w="med" len="med"/>
+                    </a:lnB>
+                    <a:solidFill>
+                      <a:schemeClr val="accent1">
+                        <a:lumMod val="40000"/>
+                        <a:lumOff val="60000"/>
+                      </a:schemeClr>
+                    </a:solidFill>
+                  </a:tcPr>
+                </a:tc>
+                <a:tc>
+                  <a:txBody>
+                    <a:bodyPr/>
+                    <a:lstStyle/>
+                    <a:p>
+                      <a:pPr algn="r"/>
+                      <a:r>
+                        <a:rPr lang="en-US" sz="1600" dirty="0">
+                          <a:solidFill>
+                            <a:schemeClr val="tx1"/>
+                          </a:solidFill>
+                        </a:rPr>
+                        <a:t>German</a:t>
+                      </a:r>
+                    </a:p>
+                  </a:txBody>
+                  <a:tcPr marL="136963" marR="136963" marT="68481" marB="68481" anchor="ctr">
+                    <a:lnT w="12700" cap="flat" cmpd="sng" algn="ctr">
+                      <a:solidFill>
+                        <a:schemeClr val="accent1"/>
+                      </a:solidFill>
+                      <a:prstDash val="solid"/>
+                      <a:round/>
+                      <a:headEnd type="none" w="med" len="med"/>
+                      <a:tailEnd type="none" w="med" len="med"/>
+                    </a:lnT>
+                    <a:lnB w="12700" cap="flat" cmpd="sng" algn="ctr">
+                      <a:solidFill>
+                        <a:schemeClr val="accent1"/>
+                      </a:solidFill>
+                      <a:prstDash val="solid"/>
+                      <a:round/>
+                      <a:headEnd type="none" w="med" len="med"/>
+                      <a:tailEnd type="none" w="med" len="med"/>
+                    </a:lnB>
+                    <a:solidFill>
+                      <a:schemeClr val="accent1">
+                        <a:lumMod val="40000"/>
+                        <a:lumOff val="60000"/>
+                      </a:schemeClr>
+                    </a:solidFill>
+                  </a:tcPr>
+                </a:tc>
+                <a:tc>
+                  <a:txBody>
+                    <a:bodyPr/>
+                    <a:lstStyle/>
+                    <a:p>
+                      <a:pPr algn="r"/>
+                      <a:r>
+                        <a:rPr lang="en-US" sz="1600" dirty="0">
+                          <a:solidFill>
+                            <a:schemeClr val="tx1"/>
+                          </a:solidFill>
+                        </a:rPr>
+                        <a:t>Chinese</a:t>
+                      </a:r>
+                    </a:p>
+                  </a:txBody>
+                  <a:tcPr marL="136963" marR="136963" marT="68481" marB="68481" anchor="ctr">
+                    <a:lnT w="12700" cap="flat" cmpd="sng" algn="ctr">
+                      <a:solidFill>
+                        <a:schemeClr val="accent1"/>
+                      </a:solidFill>
+                      <a:prstDash val="solid"/>
+                      <a:round/>
+                      <a:headEnd type="none" w="med" len="med"/>
+                      <a:tailEnd type="none" w="med" len="med"/>
+                    </a:lnT>
+                    <a:lnB w="12700" cap="flat" cmpd="sng" algn="ctr">
+                      <a:solidFill>
+                        <a:schemeClr val="accent1"/>
+                      </a:solidFill>
+                      <a:prstDash val="solid"/>
+                      <a:round/>
+                      <a:headEnd type="none" w="med" len="med"/>
+                      <a:tailEnd type="none" w="med" len="med"/>
+                    </a:lnB>
+                    <a:solidFill>
+                      <a:schemeClr val="accent1">
+                        <a:lumMod val="40000"/>
+                        <a:lumOff val="60000"/>
+                      </a:schemeClr>
+                    </a:solidFill>
+                  </a:tcPr>
+                </a:tc>
+                <a:tc>
+                  <a:txBody>
+                    <a:bodyPr/>
+                    <a:lstStyle/>
+                    <a:p>
+                      <a:pPr algn="r"/>
+                      <a:r>
+                        <a:rPr lang="en-US" sz="1600" dirty="0">
+                          <a:solidFill>
+                            <a:schemeClr val="tx1"/>
+                          </a:solidFill>
+                        </a:rPr>
+                        <a:t>Russian</a:t>
+                      </a:r>
+                    </a:p>
+                  </a:txBody>
+                  <a:tcPr marL="136963" marR="136963" marT="68481" marB="68481" anchor="ctr">
+                    <a:lnT w="12700" cap="flat" cmpd="sng" algn="ctr">
+                      <a:solidFill>
+                        <a:schemeClr val="accent1"/>
+                      </a:solidFill>
+                      <a:prstDash val="solid"/>
+                      <a:round/>
+                      <a:headEnd type="none" w="med" len="med"/>
+                      <a:tailEnd type="none" w="med" len="med"/>
+                    </a:lnT>
+                    <a:lnB w="12700" cap="flat" cmpd="sng" algn="ctr">
+                      <a:solidFill>
+                        <a:schemeClr val="accent1"/>
+                      </a:solidFill>
+                      <a:prstDash val="solid"/>
+                      <a:round/>
+                      <a:headEnd type="none" w="med" len="med"/>
+                      <a:tailEnd type="none" w="med" len="med"/>
+                    </a:lnB>
+                    <a:solidFill>
+                      <a:schemeClr val="accent1">
+                        <a:lumMod val="40000"/>
+                        <a:lumOff val="60000"/>
+                      </a:schemeClr>
+                    </a:solidFill>
+                  </a:tcPr>
+                </a:tc>
+                <a:extLst>
+                  <a:ext uri="{0D108BD9-81ED-4DB2-BD59-A6C34878D82A}">
+                    <a16:rowId xmlns:a16="http://schemas.microsoft.com/office/drawing/2014/main" val="2137538351"/>
+                  </a:ext>
+                </a:extLst>
+              </a:tr>
+            </a:tbl>
+          </a:graphicData>
+        </a:graphic>
+      </p:graphicFrame>
+      <p:sp>
+        <p:nvSpPr>
+          <p:cNvPr id="37" name="TextBox 36">
+            <a:extLst>
+              <a:ext uri="{FF2B5EF4-FFF2-40B4-BE49-F238E27FC236}">
+                <a16:creationId xmlns:a16="http://schemas.microsoft.com/office/drawing/2014/main" id="{359BD0E4-5CCB-42F9-B6EF-FEBBFED72E1E}"/>
+              </a:ext>
+            </a:extLst>
+          </p:cNvPr>
+          <p:cNvSpPr txBox="1"/>
+          <p:nvPr/>
+        </p:nvSpPr>
+        <p:spPr>
+          <a:xfrm>
+            <a:off x="3255919" y="1968667"/>
+            <a:ext cx="5680160" cy="2215991"/>
+          </a:xfrm>
+          <a:prstGeom prst="rect">
+            <a:avLst/>
+          </a:prstGeom>
+          <a:noFill/>
+        </p:spPr>
+        <p:txBody>
+          <a:bodyPr wrap="square" rtlCol="0">
+            <a:spAutoFit/>
+          </a:bodyPr>
+          <a:lstStyle/>
+          <a:p>
+            <a:pPr algn="ctr"/>
+            <a:r>
+              <a:rPr lang="en-US" sz="13800" dirty="0"/>
+              <a:t>Loren</a:t>
+            </a:r>
+          </a:p>
+        </p:txBody>
+      </p:sp>
+      <p:sp>
+        <p:nvSpPr>
+          <p:cNvPr id="36" name="TextBox 35">
+            <a:extLst>
+              <a:ext uri="{FF2B5EF4-FFF2-40B4-BE49-F238E27FC236}">
+                <a16:creationId xmlns:a16="http://schemas.microsoft.com/office/drawing/2014/main" id="{DCD42E02-C8BC-42D3-AB93-1215461355F9}"/>
+              </a:ext>
+            </a:extLst>
+          </p:cNvPr>
+          <p:cNvSpPr txBox="1"/>
+          <p:nvPr/>
+        </p:nvSpPr>
+        <p:spPr>
+          <a:xfrm>
+            <a:off x="8389" y="4310493"/>
+            <a:ext cx="5342974" cy="461665"/>
+          </a:xfrm>
+          <a:prstGeom prst="rect">
+            <a:avLst/>
+          </a:prstGeom>
+          <a:solidFill>
+            <a:schemeClr val="accent1">
+              <a:lumMod val="20000"/>
+              <a:lumOff val="80000"/>
+            </a:schemeClr>
+          </a:solidFill>
+        </p:spPr>
+        <p:txBody>
+          <a:bodyPr wrap="square" rtlCol="0">
+            <a:spAutoFit/>
+          </a:bodyPr>
+          <a:lstStyle/>
+          <a:p>
+            <a:r>
+              <a:rPr lang="en-US" sz="2400" dirty="0"/>
+              <a:t>Pronunciation</a:t>
+            </a:r>
+          </a:p>
+        </p:txBody>
+      </p:sp>
+      <p:sp>
+        <p:nvSpPr>
+          <p:cNvPr id="39" name="TextBox 38">
+            <a:extLst>
+              <a:ext uri="{FF2B5EF4-FFF2-40B4-BE49-F238E27FC236}">
+                <a16:creationId xmlns:a16="http://schemas.microsoft.com/office/drawing/2014/main" id="{D24F5E27-C734-4DA1-83A2-C0B5674AEC4A}"/>
+              </a:ext>
+            </a:extLst>
+          </p:cNvPr>
+          <p:cNvSpPr txBox="1"/>
+          <p:nvPr/>
+        </p:nvSpPr>
+        <p:spPr>
+          <a:xfrm>
+            <a:off x="6832246" y="4310492"/>
+            <a:ext cx="5351363" cy="461665"/>
+          </a:xfrm>
+          <a:prstGeom prst="rect">
+            <a:avLst/>
+          </a:prstGeom>
+          <a:solidFill>
+            <a:schemeClr val="accent1">
+              <a:lumMod val="20000"/>
+              <a:lumOff val="80000"/>
+            </a:schemeClr>
+          </a:solidFill>
+        </p:spPr>
+        <p:txBody>
+          <a:bodyPr wrap="square" rtlCol="0">
+            <a:spAutoFit/>
+          </a:bodyPr>
+          <a:lstStyle/>
+          <a:p>
+            <a:r>
+              <a:rPr lang="en-US" sz="2400" dirty="0"/>
+              <a:t>Meaning &amp; Usage</a:t>
+            </a:r>
+          </a:p>
+        </p:txBody>
+      </p:sp>
+      <p:sp>
+        <p:nvSpPr>
+          <p:cNvPr id="38" name="TextBox 37">
+            <a:extLst>
+              <a:ext uri="{FF2B5EF4-FFF2-40B4-BE49-F238E27FC236}">
+                <a16:creationId xmlns:a16="http://schemas.microsoft.com/office/drawing/2014/main" id="{DE49F9D3-B58E-41B0-B0CA-440894B824A7}"/>
+              </a:ext>
+            </a:extLst>
+          </p:cNvPr>
+          <p:cNvSpPr txBox="1"/>
+          <p:nvPr/>
+        </p:nvSpPr>
+        <p:spPr>
+          <a:xfrm>
+            <a:off x="0" y="4772157"/>
+            <a:ext cx="5342974" cy="830997"/>
+          </a:xfrm>
+          <a:prstGeom prst="rect">
+            <a:avLst/>
+          </a:prstGeom>
+          <a:noFill/>
+        </p:spPr>
+        <p:txBody>
+          <a:bodyPr wrap="square" rtlCol="0">
+            <a:spAutoFit/>
+          </a:bodyPr>
+          <a:lstStyle/>
+          <a:p>
+            <a:r>
+              <a:rPr lang="en-US" sz="2400" dirty="0"/>
+              <a:t>Phonetic </a:t>
+            </a:r>
+            <a:r>
+              <a:rPr lang="en-US" sz="2400" dirty="0" err="1"/>
+              <a:t>pronounciation</a:t>
+            </a:r>
+            <a:r>
+              <a:rPr lang="en-US" sz="2400" dirty="0"/>
+              <a:t>: /ˈ</a:t>
+            </a:r>
+            <a:r>
+              <a:rPr lang="en-US" sz="2400" dirty="0" err="1"/>
+              <a:t>lo.ɾɛn</a:t>
+            </a:r>
+            <a:r>
+              <a:rPr lang="en-US" sz="2400" dirty="0"/>
+              <a:t>/</a:t>
+            </a:r>
+          </a:p>
+          <a:p>
+            <a:r>
+              <a:rPr lang="en-US" sz="2400" dirty="0"/>
+              <a:t>English simulation: Lo-</a:t>
+            </a:r>
+            <a:r>
+              <a:rPr lang="en-US" sz="2400" dirty="0" err="1"/>
+              <a:t>ren</a:t>
+            </a:r>
+            <a:endParaRPr lang="en-US" sz="2400" dirty="0"/>
+          </a:p>
+        </p:txBody>
+      </p:sp>
+      <p:sp>
+        <p:nvSpPr>
+          <p:cNvPr id="40" name="TextBox 39">
+            <a:extLst>
+              <a:ext uri="{FF2B5EF4-FFF2-40B4-BE49-F238E27FC236}">
+                <a16:creationId xmlns:a16="http://schemas.microsoft.com/office/drawing/2014/main" id="{C3D2043A-F3CD-42C5-8924-931236B9F08F}"/>
+              </a:ext>
+            </a:extLst>
+          </p:cNvPr>
+          <p:cNvSpPr txBox="1"/>
+          <p:nvPr/>
+        </p:nvSpPr>
+        <p:spPr>
+          <a:xfrm>
+            <a:off x="6832246" y="4772157"/>
+            <a:ext cx="5351363" cy="2031325"/>
+          </a:xfrm>
+          <a:prstGeom prst="rect">
+            <a:avLst/>
+          </a:prstGeom>
+          <a:noFill/>
+        </p:spPr>
+        <p:txBody>
+          <a:bodyPr wrap="square" rtlCol="0">
+            <a:spAutoFit/>
+          </a:bodyPr>
+          <a:lstStyle/>
+          <a:p>
+            <a:r>
+              <a:rPr lang="en-US" dirty="0"/>
+              <a:t>Lorem ipsum dolor sit </a:t>
+            </a:r>
+            <a:r>
+              <a:rPr lang="en-US" dirty="0" err="1"/>
+              <a:t>amet</a:t>
+            </a:r>
+            <a:r>
+              <a:rPr lang="en-US" dirty="0"/>
+              <a:t>, </a:t>
+            </a:r>
+            <a:r>
+              <a:rPr lang="en-US" dirty="0" err="1"/>
+              <a:t>consectetur</a:t>
+            </a:r>
+            <a:r>
+              <a:rPr lang="en-US" dirty="0"/>
+              <a:t> </a:t>
+            </a:r>
+            <a:r>
+              <a:rPr lang="en-US" dirty="0" err="1"/>
+              <a:t>adipiscing</a:t>
+            </a:r>
+            <a:r>
+              <a:rPr lang="en-US" dirty="0"/>
+              <a:t> </a:t>
+            </a:r>
+            <a:r>
+              <a:rPr lang="en-US" dirty="0" err="1"/>
+              <a:t>elit</a:t>
+            </a:r>
+            <a:r>
+              <a:rPr lang="en-US" dirty="0"/>
+              <a:t>. </a:t>
+            </a:r>
+            <a:r>
+              <a:rPr lang="en-US" dirty="0" err="1"/>
+              <a:t>Praesent</a:t>
+            </a:r>
+            <a:r>
+              <a:rPr lang="en-US" dirty="0"/>
+              <a:t> </a:t>
+            </a:r>
+            <a:r>
+              <a:rPr lang="en-US" dirty="0" err="1"/>
+              <a:t>interdum</a:t>
+            </a:r>
+            <a:r>
+              <a:rPr lang="en-US" dirty="0"/>
+              <a:t> </a:t>
+            </a:r>
+            <a:r>
+              <a:rPr lang="en-US" dirty="0" err="1"/>
+              <a:t>est</a:t>
+            </a:r>
+            <a:r>
+              <a:rPr lang="en-US" dirty="0"/>
+              <a:t> </a:t>
+            </a:r>
+            <a:r>
+              <a:rPr lang="en-US" dirty="0" err="1"/>
+              <a:t>tincidunt</a:t>
+            </a:r>
+            <a:r>
+              <a:rPr lang="en-US" dirty="0"/>
+              <a:t> </a:t>
+            </a:r>
+            <a:r>
+              <a:rPr lang="en-US" dirty="0" err="1"/>
+              <a:t>consequat</a:t>
+            </a:r>
+            <a:r>
+              <a:rPr lang="en-US" dirty="0"/>
+              <a:t> gravida. Integer </a:t>
+            </a:r>
+            <a:r>
+              <a:rPr lang="en-US" dirty="0" err="1"/>
+              <a:t>quis</a:t>
+            </a:r>
+            <a:r>
+              <a:rPr lang="en-US" dirty="0"/>
+              <a:t> </a:t>
+            </a:r>
+            <a:r>
+              <a:rPr lang="en-US" dirty="0" err="1"/>
+              <a:t>turpis</a:t>
+            </a:r>
+            <a:r>
+              <a:rPr lang="en-US" dirty="0"/>
+              <a:t> </a:t>
+            </a:r>
+            <a:r>
+              <a:rPr lang="en-US" dirty="0" err="1"/>
+              <a:t>nisl</a:t>
+            </a:r>
+            <a:r>
+              <a:rPr lang="en-US" dirty="0"/>
+              <a:t>. Ut </a:t>
+            </a:r>
+            <a:r>
+              <a:rPr lang="en-US" dirty="0" err="1"/>
+              <a:t>efficitur</a:t>
+            </a:r>
+            <a:r>
+              <a:rPr lang="en-US" dirty="0"/>
+              <a:t> </a:t>
+            </a:r>
+            <a:r>
+              <a:rPr lang="en-US" dirty="0" err="1"/>
+              <a:t>felis</a:t>
+            </a:r>
+            <a:r>
+              <a:rPr lang="en-US" dirty="0"/>
+              <a:t> ac libero </a:t>
+            </a:r>
+            <a:r>
+              <a:rPr lang="en-US" dirty="0" err="1"/>
+              <a:t>molestie</a:t>
+            </a:r>
+            <a:r>
+              <a:rPr lang="en-US" dirty="0"/>
+              <a:t> pulvinar. Morbi </a:t>
+            </a:r>
+            <a:r>
+              <a:rPr lang="en-US" dirty="0" err="1"/>
+              <a:t>viverra</a:t>
+            </a:r>
+            <a:r>
+              <a:rPr lang="en-US" dirty="0"/>
+              <a:t> </a:t>
+            </a:r>
+            <a:r>
+              <a:rPr lang="en-US" dirty="0" err="1"/>
+              <a:t>neque</a:t>
+            </a:r>
+            <a:r>
+              <a:rPr lang="en-US" dirty="0"/>
+              <a:t> </a:t>
+            </a:r>
+            <a:r>
+              <a:rPr lang="en-US" dirty="0" err="1"/>
+              <a:t>mattis</a:t>
+            </a:r>
+            <a:r>
+              <a:rPr lang="en-US" dirty="0"/>
+              <a:t>, </a:t>
+            </a:r>
+            <a:r>
+              <a:rPr lang="en-US" dirty="0" err="1"/>
+              <a:t>posuere</a:t>
+            </a:r>
+            <a:r>
+              <a:rPr lang="en-US" dirty="0"/>
+              <a:t> </a:t>
+            </a:r>
+            <a:r>
+              <a:rPr lang="en-US" dirty="0" err="1"/>
+              <a:t>tellus</a:t>
+            </a:r>
+            <a:r>
+              <a:rPr lang="en-US" dirty="0"/>
+              <a:t> </a:t>
+            </a:r>
+            <a:r>
+              <a:rPr lang="en-US" dirty="0" err="1"/>
+              <a:t>quis</a:t>
+            </a:r>
+            <a:r>
+              <a:rPr lang="en-US" dirty="0"/>
+              <a:t>, cursus </a:t>
+            </a:r>
+            <a:r>
+              <a:rPr lang="en-US" dirty="0" err="1"/>
+              <a:t>felis</a:t>
+            </a:r>
+            <a:r>
+              <a:rPr lang="en-US" dirty="0"/>
+              <a:t>. Nam </a:t>
+            </a:r>
+            <a:r>
+              <a:rPr lang="en-US" dirty="0" err="1"/>
+              <a:t>venenatis</a:t>
+            </a:r>
+            <a:r>
+              <a:rPr lang="en-US" dirty="0"/>
+              <a:t> gravida </a:t>
+            </a:r>
+            <a:r>
+              <a:rPr lang="en-US" dirty="0" err="1"/>
+              <a:t>orci</a:t>
+            </a:r>
+            <a:r>
+              <a:rPr lang="en-US" dirty="0"/>
+              <a:t> </a:t>
+            </a:r>
+            <a:r>
+              <a:rPr lang="en-US" dirty="0" err="1"/>
+              <a:t>imperdiet</a:t>
+            </a:r>
+            <a:r>
+              <a:rPr lang="en-US" dirty="0"/>
+              <a:t> </a:t>
+            </a:r>
+            <a:r>
+              <a:rPr lang="en-US" dirty="0" err="1"/>
+              <a:t>malesuada</a:t>
+            </a:r>
+            <a:r>
+              <a:rPr lang="en-US" dirty="0"/>
+              <a:t>. Morbi </a:t>
+            </a:r>
+            <a:r>
+              <a:rPr lang="en-US" dirty="0" err="1"/>
+              <a:t>dapibus</a:t>
+            </a:r>
+            <a:r>
+              <a:rPr lang="en-US" dirty="0"/>
+              <a:t> magna vitae </a:t>
+            </a:r>
+            <a:r>
+              <a:rPr lang="en-US" dirty="0" err="1"/>
+              <a:t>accumsan</a:t>
+            </a:r>
+            <a:r>
+              <a:rPr lang="en-US" dirty="0"/>
+              <a:t> </a:t>
+            </a:r>
+            <a:r>
+              <a:rPr lang="en-US" dirty="0" err="1"/>
+              <a:t>sodales</a:t>
+            </a:r>
+            <a:r>
+              <a:rPr lang="en-US" dirty="0"/>
+              <a:t>. </a:t>
+            </a:r>
+            <a:r>
+              <a:rPr lang="en-US" dirty="0" err="1"/>
+              <a:t>Aenean</a:t>
+            </a:r>
+            <a:r>
+              <a:rPr lang="en-US" dirty="0"/>
+              <a:t> et </a:t>
+            </a:r>
+            <a:r>
+              <a:rPr lang="en-US" dirty="0" err="1"/>
+              <a:t>volutpat</a:t>
+            </a:r>
+            <a:r>
+              <a:rPr lang="en-US" dirty="0"/>
+              <a:t> </a:t>
+            </a:r>
+            <a:r>
+              <a:rPr lang="en-US" dirty="0" err="1"/>
+              <a:t>tellus</a:t>
+            </a:r>
+            <a:r>
+              <a:rPr lang="en-US" dirty="0"/>
+              <a:t>.</a:t>
+            </a:r>
+          </a:p>
+        </p:txBody>
+      </p:sp>
+      <p:sp>
+        <p:nvSpPr>
+          <p:cNvPr id="44" name="Title 1">
+            <a:extLst>
+              <a:ext uri="{FF2B5EF4-FFF2-40B4-BE49-F238E27FC236}">
+                <a16:creationId xmlns:a16="http://schemas.microsoft.com/office/drawing/2014/main" id="{CE9E515C-450C-4958-BE67-F61C8D98BA4A}"/>
+              </a:ext>
+            </a:extLst>
+          </p:cNvPr>
+          <p:cNvSpPr txBox="1">
+            <a:spLocks/>
+          </p:cNvSpPr>
+          <p:nvPr/>
+        </p:nvSpPr>
+        <p:spPr>
+          <a:xfrm>
+            <a:off x="4303877" y="237078"/>
+            <a:ext cx="3112316" cy="670473"/>
+          </a:xfrm>
+          <a:prstGeom prst="rect">
+            <a:avLst/>
+          </a:prstGeom>
+        </p:spPr>
+        <p:txBody>
+          <a:bodyPr vert="horz" lIns="91440" tIns="45720" rIns="91440" bIns="45720" rtlCol="0" anchor="b">
+            <a:normAutofit fontScale="82500" lnSpcReduction="20000"/>
+          </a:bodyPr>
+          <a:lstStyle>
+            <a:lvl1pPr algn="ctr" defTabSz="914400" rtl="0" eaLnBrk="1" latinLnBrk="0" hangingPunct="1">
+              <a:lnSpc>
+                <a:spcPct val="90000"/>
+              </a:lnSpc>
+              <a:spcBef>
+                <a:spcPct val="0"/>
+              </a:spcBef>
+              <a:buNone/>
+              <a:defRPr sz="6000" kern="1200">
+                <a:solidFill>
+                  <a:schemeClr val="tx1"/>
+                </a:solidFill>
+                <a:latin typeface="+mj-lt"/>
+                <a:ea typeface="+mj-ea"/>
+                <a:cs typeface="+mj-cs"/>
+              </a:defRPr>
+            </a:lvl1pPr>
+          </a:lstStyle>
+          <a:p>
+            <a:r>
+              <a:rPr lang="en-US"/>
+              <a:t>APPNAME</a:t>
+            </a:r>
+            <a:endParaRPr lang="en-US" dirty="0"/>
+          </a:p>
+        </p:txBody>
+      </p:sp>
+      <p:pic>
+        <p:nvPicPr>
+          <p:cNvPr id="45" name="Picture 44">
+            <a:extLst>
+              <a:ext uri="{FF2B5EF4-FFF2-40B4-BE49-F238E27FC236}">
+                <a16:creationId xmlns:a16="http://schemas.microsoft.com/office/drawing/2014/main" id="{C868C0F5-2A13-4F8D-8968-2C78BD5A270F}"/>
+              </a:ext>
+            </a:extLst>
+          </p:cNvPr>
+          <p:cNvPicPr>
+            <a:picLocks noChangeAspect="1"/>
+          </p:cNvPicPr>
+          <p:nvPr/>
+        </p:nvPicPr>
+        <p:blipFill>
+          <a:blip r:embed="rId2"/>
+          <a:stretch>
+            <a:fillRect/>
+          </a:stretch>
+        </p:blipFill>
+        <p:spPr>
+          <a:xfrm>
+            <a:off x="11447357" y="253249"/>
+            <a:ext cx="577767" cy="555460"/>
+          </a:xfrm>
+          <a:prstGeom prst="rect">
+            <a:avLst/>
+          </a:prstGeom>
+        </p:spPr>
+      </p:pic>
+      <p:pic>
+        <p:nvPicPr>
+          <p:cNvPr id="46" name="Picture 45">
+            <a:extLst>
+              <a:ext uri="{FF2B5EF4-FFF2-40B4-BE49-F238E27FC236}">
+                <a16:creationId xmlns:a16="http://schemas.microsoft.com/office/drawing/2014/main" id="{D54851C7-D55B-40D7-AD61-E9B6A0754950}"/>
+              </a:ext>
+            </a:extLst>
+          </p:cNvPr>
+          <p:cNvPicPr>
+            <a:picLocks noChangeAspect="1"/>
+          </p:cNvPicPr>
+          <p:nvPr/>
+        </p:nvPicPr>
+        <p:blipFill>
+          <a:blip r:embed="rId3"/>
+          <a:stretch>
+            <a:fillRect/>
+          </a:stretch>
+        </p:blipFill>
+        <p:spPr>
+          <a:xfrm>
+            <a:off x="125022" y="1160982"/>
+            <a:ext cx="517061" cy="343948"/>
+          </a:xfrm>
+          <a:prstGeom prst="rect">
+            <a:avLst/>
+          </a:prstGeom>
+        </p:spPr>
+      </p:pic>
+      <p:pic>
+        <p:nvPicPr>
+          <p:cNvPr id="47" name="Picture 46">
+            <a:extLst>
+              <a:ext uri="{FF2B5EF4-FFF2-40B4-BE49-F238E27FC236}">
+                <a16:creationId xmlns:a16="http://schemas.microsoft.com/office/drawing/2014/main" id="{11FB03DB-6C31-4172-9EE3-FED596CB2D4D}"/>
+              </a:ext>
+            </a:extLst>
+          </p:cNvPr>
+          <p:cNvPicPr>
+            <a:picLocks noChangeAspect="1"/>
+          </p:cNvPicPr>
+          <p:nvPr/>
+        </p:nvPicPr>
+        <p:blipFill>
+          <a:blip r:embed="rId4"/>
+          <a:stretch>
+            <a:fillRect/>
+          </a:stretch>
+        </p:blipFill>
+        <p:spPr>
+          <a:xfrm>
+            <a:off x="1861543" y="1160982"/>
+            <a:ext cx="517061" cy="343948"/>
+          </a:xfrm>
+          <a:prstGeom prst="rect">
+            <a:avLst/>
+          </a:prstGeom>
+        </p:spPr>
+      </p:pic>
+      <p:pic>
+        <p:nvPicPr>
+          <p:cNvPr id="48" name="Picture 47">
+            <a:extLst>
+              <a:ext uri="{FF2B5EF4-FFF2-40B4-BE49-F238E27FC236}">
+                <a16:creationId xmlns:a16="http://schemas.microsoft.com/office/drawing/2014/main" id="{1F663FBE-FA88-40E1-84E1-3EFC98632790}"/>
+              </a:ext>
+            </a:extLst>
+          </p:cNvPr>
+          <p:cNvPicPr>
+            <a:picLocks noChangeAspect="1"/>
+          </p:cNvPicPr>
+          <p:nvPr/>
+        </p:nvPicPr>
+        <p:blipFill>
+          <a:blip r:embed="rId5"/>
+          <a:stretch>
+            <a:fillRect/>
+          </a:stretch>
+        </p:blipFill>
+        <p:spPr>
+          <a:xfrm>
+            <a:off x="3598064" y="1160982"/>
+            <a:ext cx="517061" cy="343948"/>
+          </a:xfrm>
+          <a:prstGeom prst="rect">
+            <a:avLst/>
+          </a:prstGeom>
+        </p:spPr>
+      </p:pic>
+      <p:pic>
+        <p:nvPicPr>
+          <p:cNvPr id="49" name="Picture 48">
+            <a:extLst>
+              <a:ext uri="{FF2B5EF4-FFF2-40B4-BE49-F238E27FC236}">
+                <a16:creationId xmlns:a16="http://schemas.microsoft.com/office/drawing/2014/main" id="{76A0A855-B58B-4C82-A7CA-8EF86E0009F3}"/>
+              </a:ext>
+            </a:extLst>
+          </p:cNvPr>
+          <p:cNvPicPr>
+            <a:picLocks noChangeAspect="1"/>
+          </p:cNvPicPr>
+          <p:nvPr/>
+        </p:nvPicPr>
+        <p:blipFill>
+          <a:blip r:embed="rId6"/>
+          <a:stretch>
+            <a:fillRect/>
+          </a:stretch>
+        </p:blipFill>
+        <p:spPr>
+          <a:xfrm>
+            <a:off x="5342974" y="1160982"/>
+            <a:ext cx="517061" cy="343948"/>
+          </a:xfrm>
+          <a:prstGeom prst="rect">
+            <a:avLst/>
+          </a:prstGeom>
+        </p:spPr>
+      </p:pic>
+      <p:pic>
+        <p:nvPicPr>
+          <p:cNvPr id="50" name="Picture 49">
+            <a:extLst>
+              <a:ext uri="{FF2B5EF4-FFF2-40B4-BE49-F238E27FC236}">
+                <a16:creationId xmlns:a16="http://schemas.microsoft.com/office/drawing/2014/main" id="{68D592BE-9656-4F18-A9DB-F63A9C2AE09D}"/>
+              </a:ext>
+            </a:extLst>
+          </p:cNvPr>
+          <p:cNvPicPr>
+            <a:picLocks noChangeAspect="1"/>
+          </p:cNvPicPr>
+          <p:nvPr/>
+        </p:nvPicPr>
+        <p:blipFill>
+          <a:blip r:embed="rId7"/>
+          <a:stretch>
+            <a:fillRect/>
+          </a:stretch>
+        </p:blipFill>
+        <p:spPr>
+          <a:xfrm>
+            <a:off x="7087884" y="1160982"/>
+            <a:ext cx="571561" cy="343948"/>
+          </a:xfrm>
+          <a:prstGeom prst="rect">
+            <a:avLst/>
+          </a:prstGeom>
+        </p:spPr>
+      </p:pic>
+      <p:pic>
+        <p:nvPicPr>
+          <p:cNvPr id="51" name="Picture 50">
+            <a:extLst>
+              <a:ext uri="{FF2B5EF4-FFF2-40B4-BE49-F238E27FC236}">
+                <a16:creationId xmlns:a16="http://schemas.microsoft.com/office/drawing/2014/main" id="{6C8DE1FD-7253-44DE-AD59-EA0347304E35}"/>
+              </a:ext>
+            </a:extLst>
+          </p:cNvPr>
+          <p:cNvPicPr>
+            <a:picLocks noChangeAspect="1"/>
+          </p:cNvPicPr>
+          <p:nvPr/>
+        </p:nvPicPr>
+        <p:blipFill>
+          <a:blip r:embed="rId8"/>
+          <a:stretch>
+            <a:fillRect/>
+          </a:stretch>
+        </p:blipFill>
+        <p:spPr>
+          <a:xfrm>
+            <a:off x="8878905" y="1160982"/>
+            <a:ext cx="517061" cy="343948"/>
+          </a:xfrm>
+          <a:prstGeom prst="rect">
+            <a:avLst/>
+          </a:prstGeom>
+        </p:spPr>
+      </p:pic>
+      <p:sp>
+        <p:nvSpPr>
+          <p:cNvPr id="52" name="TextBox 51">
+            <a:extLst>
+              <a:ext uri="{FF2B5EF4-FFF2-40B4-BE49-F238E27FC236}">
+                <a16:creationId xmlns:a16="http://schemas.microsoft.com/office/drawing/2014/main" id="{EC95C66F-5BC8-490C-B27C-7EF276C73008}"/>
+              </a:ext>
+            </a:extLst>
+          </p:cNvPr>
+          <p:cNvSpPr txBox="1"/>
+          <p:nvPr/>
+        </p:nvSpPr>
+        <p:spPr>
+          <a:xfrm>
+            <a:off x="8619305" y="336694"/>
+            <a:ext cx="1996121" cy="369332"/>
+          </a:xfrm>
+          <a:prstGeom prst="rect">
+            <a:avLst/>
+          </a:prstGeom>
+          <a:noFill/>
+          <a:ln>
+            <a:solidFill>
+              <a:schemeClr val="bg1">
+                <a:lumMod val="65000"/>
+              </a:schemeClr>
+            </a:solidFill>
+          </a:ln>
+        </p:spPr>
+        <p:txBody>
+          <a:bodyPr wrap="square" rtlCol="0">
+            <a:spAutoFit/>
+          </a:bodyPr>
+          <a:lstStyle/>
+          <a:p>
+            <a:r>
+              <a:rPr lang="en-US" dirty="0"/>
+              <a:t>Word of the Day</a:t>
+            </a:r>
+          </a:p>
+        </p:txBody>
+      </p:sp>
+      <p:sp>
+        <p:nvSpPr>
+          <p:cNvPr id="53" name="Isosceles Triangle 52">
+            <a:extLst>
+              <a:ext uri="{FF2B5EF4-FFF2-40B4-BE49-F238E27FC236}">
+                <a16:creationId xmlns:a16="http://schemas.microsoft.com/office/drawing/2014/main" id="{890068DB-CD3C-4A72-B49B-BBA99066A336}"/>
+              </a:ext>
+            </a:extLst>
+          </p:cNvPr>
+          <p:cNvSpPr/>
+          <p:nvPr/>
+        </p:nvSpPr>
+        <p:spPr>
+          <a:xfrm rot="10800000">
+            <a:off x="10387651" y="480024"/>
+            <a:ext cx="118215" cy="101910"/>
+          </a:xfrm>
+          <a:prstGeom prst="triangle">
+            <a:avLst/>
+          </a:prstGeom>
+          <a:solidFill>
+            <a:schemeClr val="tx1"/>
+          </a:solidFill>
+          <a:ln>
+            <a:solidFill>
+              <a:schemeClr val="tx1"/>
+            </a:solidFill>
+          </a:ln>
+        </p:spPr>
+        <p:style>
+          <a:lnRef idx="2">
+            <a:schemeClr val="accent1">
+              <a:shade val="50000"/>
+            </a:schemeClr>
+          </a:lnRef>
+          <a:fillRef idx="1">
+            <a:schemeClr val="accent1"/>
+          </a:fillRef>
+          <a:effectRef idx="0">
+            <a:schemeClr val="accent1"/>
+          </a:effectRef>
+          <a:fontRef idx="minor">
+            <a:schemeClr val="lt1"/>
+          </a:fontRef>
+        </p:style>
+        <p:txBody>
+          <a:bodyPr rtlCol="0" anchor="ctr"/>
+          <a:lstStyle/>
+          <a:p>
+            <a:pPr algn="ctr"/>
+            <a:endParaRPr lang="en-US"/>
+          </a:p>
+        </p:txBody>
+      </p:sp>
+      <p:pic>
+        <p:nvPicPr>
+          <p:cNvPr id="54" name="Picture 53">
+            <a:extLst>
+              <a:ext uri="{FF2B5EF4-FFF2-40B4-BE49-F238E27FC236}">
+                <a16:creationId xmlns:a16="http://schemas.microsoft.com/office/drawing/2014/main" id="{561ED4C5-3732-484D-9574-BAB6EBC8C01C}"/>
+              </a:ext>
+            </a:extLst>
+          </p:cNvPr>
+          <p:cNvPicPr>
+            <a:picLocks noChangeAspect="1"/>
+          </p:cNvPicPr>
+          <p:nvPr/>
+        </p:nvPicPr>
+        <p:blipFill>
+          <a:blip r:embed="rId9"/>
+          <a:stretch>
+            <a:fillRect/>
+          </a:stretch>
+        </p:blipFill>
+        <p:spPr>
+          <a:xfrm>
+            <a:off x="10615426" y="1160805"/>
+            <a:ext cx="517061" cy="343948"/>
+          </a:xfrm>
+          <a:prstGeom prst="rect">
+            <a:avLst/>
+          </a:prstGeom>
+        </p:spPr>
+      </p:pic>
+      <p:graphicFrame>
+        <p:nvGraphicFramePr>
+          <p:cNvPr id="55" name="Table 54">
+            <a:extLst>
+              <a:ext uri="{FF2B5EF4-FFF2-40B4-BE49-F238E27FC236}">
+                <a16:creationId xmlns:a16="http://schemas.microsoft.com/office/drawing/2014/main" id="{92480899-10DA-4AF7-B68C-77E7FE787A5D}"/>
+              </a:ext>
+            </a:extLst>
+          </p:cNvPr>
+          <p:cNvGraphicFramePr>
+            <a:graphicFrameLocks noGrp="1"/>
+          </p:cNvGraphicFramePr>
+          <p:nvPr/>
+        </p:nvGraphicFramePr>
+        <p:xfrm>
+          <a:off x="10922239" y="336691"/>
+          <a:ext cx="420495" cy="401820"/>
+        </p:xfrm>
+        <a:graphic>
+          <a:graphicData uri="http://schemas.openxmlformats.org/drawingml/2006/table">
+            <a:tbl>
+              <a:tblPr firstRow="1" bandRow="1">
+                <a:tableStyleId>{5C22544A-7EE6-4342-B048-85BDC9FD1C3A}</a:tableStyleId>
+              </a:tblPr>
+              <a:tblGrid>
+                <a:gridCol w="59067">
+                  <a:extLst>
+                    <a:ext uri="{9D8B030D-6E8A-4147-A177-3AD203B41FA5}">
+                      <a16:colId xmlns:a16="http://schemas.microsoft.com/office/drawing/2014/main" val="3545709835"/>
+                    </a:ext>
+                  </a:extLst>
+                </a:gridCol>
+                <a:gridCol w="59067">
+                  <a:extLst>
+                    <a:ext uri="{9D8B030D-6E8A-4147-A177-3AD203B41FA5}">
+                      <a16:colId xmlns:a16="http://schemas.microsoft.com/office/drawing/2014/main" val="1536539272"/>
+                    </a:ext>
+                  </a:extLst>
+                </a:gridCol>
+                <a:gridCol w="59067">
+                  <a:extLst>
+                    <a:ext uri="{9D8B030D-6E8A-4147-A177-3AD203B41FA5}">
+                      <a16:colId xmlns:a16="http://schemas.microsoft.com/office/drawing/2014/main" val="724148412"/>
+                    </a:ext>
+                  </a:extLst>
+                </a:gridCol>
+                <a:gridCol w="66734">
+                  <a:extLst>
+                    <a:ext uri="{9D8B030D-6E8A-4147-A177-3AD203B41FA5}">
+                      <a16:colId xmlns:a16="http://schemas.microsoft.com/office/drawing/2014/main" val="3972265715"/>
+                    </a:ext>
+                  </a:extLst>
+                </a:gridCol>
+                <a:gridCol w="58426">
+                  <a:extLst>
+                    <a:ext uri="{9D8B030D-6E8A-4147-A177-3AD203B41FA5}">
+                      <a16:colId xmlns:a16="http://schemas.microsoft.com/office/drawing/2014/main" val="235822871"/>
+                    </a:ext>
+                  </a:extLst>
+                </a:gridCol>
+                <a:gridCol w="59067">
+                  <a:extLst>
+                    <a:ext uri="{9D8B030D-6E8A-4147-A177-3AD203B41FA5}">
+                      <a16:colId xmlns:a16="http://schemas.microsoft.com/office/drawing/2014/main" val="3787159753"/>
+                    </a:ext>
+                  </a:extLst>
+                </a:gridCol>
+                <a:gridCol w="59067">
+                  <a:extLst>
+                    <a:ext uri="{9D8B030D-6E8A-4147-A177-3AD203B41FA5}">
+                      <a16:colId xmlns:a16="http://schemas.microsoft.com/office/drawing/2014/main" val="619306071"/>
+                    </a:ext>
+                  </a:extLst>
+                </a:gridCol>
+              </a:tblGrid>
+              <a:tr h="66970">
+                <a:tc>
+                  <a:txBody>
+                    <a:bodyPr/>
+                    <a:lstStyle/>
+                    <a:p>
+                      <a:endParaRPr lang="en-US" sz="300" dirty="0"/>
+                    </a:p>
+                  </a:txBody>
+                  <a:tcPr marL="16513" marR="16513" marT="8257" marB="8257">
+                    <a:lnL w="12700" cap="flat" cmpd="sng" algn="ctr">
+                      <a:solidFill>
+                        <a:schemeClr val="accent1"/>
+                      </a:solidFill>
+                      <a:prstDash val="solid"/>
+                      <a:round/>
+                      <a:headEnd type="none" w="med" len="med"/>
+                      <a:tailEnd type="none" w="med" len="med"/>
+                    </a:lnL>
+                    <a:lnT w="12700" cap="flat" cmpd="sng" algn="ctr">
+                      <a:solidFill>
+                        <a:schemeClr val="accent1"/>
+                      </a:solidFill>
+                      <a:prstDash val="solid"/>
+                      <a:round/>
+                      <a:headEnd type="none" w="med" len="med"/>
+                      <a:tailEnd type="none" w="med" len="med"/>
+                    </a:lnT>
+                  </a:tcPr>
+                </a:tc>
+                <a:tc>
+                  <a:txBody>
+                    <a:bodyPr/>
+                    <a:lstStyle/>
+                    <a:p>
+                      <a:endParaRPr lang="en-US" sz="300"/>
+                    </a:p>
+                  </a:txBody>
+                  <a:tcPr marL="16513" marR="16513" marT="8257" marB="8257">
+                    <a:lnT w="12700" cap="flat" cmpd="sng" algn="ctr">
+                      <a:solidFill>
+                        <a:schemeClr val="accent1"/>
+                      </a:solidFill>
+                      <a:prstDash val="solid"/>
+                      <a:round/>
+                      <a:headEnd type="none" w="med" len="med"/>
+                      <a:tailEnd type="none" w="med" len="med"/>
+                    </a:lnT>
+                  </a:tcPr>
+                </a:tc>
+                <a:tc>
+                  <a:txBody>
+                    <a:bodyPr/>
+                    <a:lstStyle/>
+                    <a:p>
+                      <a:endParaRPr lang="en-US" sz="300"/>
+                    </a:p>
+                  </a:txBody>
+                  <a:tcPr marL="16513" marR="16513" marT="8257" marB="8257">
+                    <a:lnT w="12700" cap="flat" cmpd="sng" algn="ctr">
+                      <a:solidFill>
+                        <a:schemeClr val="accent1"/>
+                      </a:solidFill>
+                      <a:prstDash val="solid"/>
+                      <a:round/>
+                      <a:headEnd type="none" w="med" len="med"/>
+                      <a:tailEnd type="none" w="med" len="med"/>
+                    </a:lnT>
+                  </a:tcPr>
+                </a:tc>
+                <a:tc>
+                  <a:txBody>
+                    <a:bodyPr/>
+                    <a:lstStyle/>
+                    <a:p>
+                      <a:endParaRPr lang="en-US" sz="300"/>
+                    </a:p>
+                  </a:txBody>
+                  <a:tcPr marL="16513" marR="16513" marT="8257" marB="8257">
+                    <a:lnT w="12700" cap="flat" cmpd="sng" algn="ctr">
+                      <a:solidFill>
+                        <a:schemeClr val="accent1"/>
+                      </a:solidFill>
+                      <a:prstDash val="solid"/>
+                      <a:round/>
+                      <a:headEnd type="none" w="med" len="med"/>
+                      <a:tailEnd type="none" w="med" len="med"/>
+                    </a:lnT>
+                  </a:tcPr>
+                </a:tc>
+                <a:tc>
+                  <a:txBody>
+                    <a:bodyPr/>
+                    <a:lstStyle/>
+                    <a:p>
+                      <a:endParaRPr lang="en-US" sz="300"/>
+                    </a:p>
+                  </a:txBody>
+                  <a:tcPr marL="16513" marR="16513" marT="8257" marB="8257">
+                    <a:lnT w="12700" cap="flat" cmpd="sng" algn="ctr">
+                      <a:solidFill>
+                        <a:schemeClr val="accent1"/>
+                      </a:solidFill>
+                      <a:prstDash val="solid"/>
+                      <a:round/>
+                      <a:headEnd type="none" w="med" len="med"/>
+                      <a:tailEnd type="none" w="med" len="med"/>
+                    </a:lnT>
+                  </a:tcPr>
+                </a:tc>
+                <a:tc>
+                  <a:txBody>
+                    <a:bodyPr/>
+                    <a:lstStyle/>
+                    <a:p>
+                      <a:endParaRPr lang="en-US" sz="300"/>
+                    </a:p>
+                  </a:txBody>
+                  <a:tcPr marL="16513" marR="16513" marT="8257" marB="8257">
+                    <a:lnT w="12700" cap="flat" cmpd="sng" algn="ctr">
+                      <a:solidFill>
+                        <a:schemeClr val="accent1"/>
+                      </a:solidFill>
+                      <a:prstDash val="solid"/>
+                      <a:round/>
+                      <a:headEnd type="none" w="med" len="med"/>
+                      <a:tailEnd type="none" w="med" len="med"/>
+                    </a:lnT>
+                  </a:tcPr>
+                </a:tc>
+                <a:tc>
+                  <a:txBody>
+                    <a:bodyPr/>
+                    <a:lstStyle/>
+                    <a:p>
+                      <a:endParaRPr lang="en-US" sz="300"/>
+                    </a:p>
+                  </a:txBody>
+                  <a:tcPr marL="16513" marR="16513" marT="8257" marB="8257">
+                    <a:lnR w="12700" cap="flat" cmpd="sng" algn="ctr">
+                      <a:solidFill>
+                        <a:schemeClr val="accent1"/>
+                      </a:solidFill>
+                      <a:prstDash val="solid"/>
+                      <a:round/>
+                      <a:headEnd type="none" w="med" len="med"/>
+                      <a:tailEnd type="none" w="med" len="med"/>
+                    </a:lnR>
+                    <a:lnT w="12700" cap="flat" cmpd="sng" algn="ctr">
+                      <a:solidFill>
+                        <a:schemeClr val="accent1"/>
+                      </a:solidFill>
+                      <a:prstDash val="solid"/>
+                      <a:round/>
+                      <a:headEnd type="none" w="med" len="med"/>
+                      <a:tailEnd type="none" w="med" len="med"/>
+                    </a:lnT>
+                  </a:tcPr>
+                </a:tc>
+                <a:extLst>
+                  <a:ext uri="{0D108BD9-81ED-4DB2-BD59-A6C34878D82A}">
+                    <a16:rowId xmlns:a16="http://schemas.microsoft.com/office/drawing/2014/main" val="897312188"/>
+                  </a:ext>
+                </a:extLst>
+              </a:tr>
+              <a:tr h="66970">
+                <a:tc>
+                  <a:txBody>
+                    <a:bodyPr/>
+                    <a:lstStyle/>
+                    <a:p>
+                      <a:endParaRPr lang="en-US" sz="300"/>
+                    </a:p>
+                  </a:txBody>
+                  <a:tcPr marL="16513" marR="16513" marT="8257" marB="8257">
+                    <a:lnL w="12700" cap="flat" cmpd="sng" algn="ctr">
+                      <a:solidFill>
+                        <a:schemeClr val="accent1"/>
+                      </a:solidFill>
+                      <a:prstDash val="solid"/>
+                      <a:round/>
+                      <a:headEnd type="none" w="med" len="med"/>
+                      <a:tailEnd type="none" w="med" len="med"/>
+                    </a:lnL>
+                  </a:tcPr>
+                </a:tc>
+                <a:tc>
+                  <a:txBody>
+                    <a:bodyPr/>
+                    <a:lstStyle/>
+                    <a:p>
+                      <a:endParaRPr lang="en-US" sz="300"/>
+                    </a:p>
+                  </a:txBody>
+                  <a:tcPr marL="16513" marR="16513" marT="8257" marB="8257"/>
+                </a:tc>
+                <a:tc>
+                  <a:txBody>
+                    <a:bodyPr/>
+                    <a:lstStyle/>
+                    <a:p>
+                      <a:endParaRPr lang="en-US" sz="300"/>
+                    </a:p>
+                  </a:txBody>
+                  <a:tcPr marL="16513" marR="16513" marT="8257" marB="8257"/>
+                </a:tc>
+                <a:tc>
+                  <a:txBody>
+                    <a:bodyPr/>
+                    <a:lstStyle/>
+                    <a:p>
+                      <a:endParaRPr lang="en-US" sz="300"/>
+                    </a:p>
+                  </a:txBody>
+                  <a:tcPr marL="16513" marR="16513" marT="8257" marB="8257"/>
+                </a:tc>
+                <a:tc>
+                  <a:txBody>
+                    <a:bodyPr/>
+                    <a:lstStyle/>
+                    <a:p>
+                      <a:endParaRPr lang="en-US" sz="300"/>
+                    </a:p>
+                  </a:txBody>
+                  <a:tcPr marL="16513" marR="16513" marT="8257" marB="8257"/>
+                </a:tc>
+                <a:tc>
+                  <a:txBody>
+                    <a:bodyPr/>
+                    <a:lstStyle/>
+                    <a:p>
+                      <a:endParaRPr lang="en-US" sz="300"/>
+                    </a:p>
+                  </a:txBody>
+                  <a:tcPr marL="16513" marR="16513" marT="8257" marB="8257"/>
+                </a:tc>
+                <a:tc>
+                  <a:txBody>
+                    <a:bodyPr/>
+                    <a:lstStyle/>
+                    <a:p>
+                      <a:endParaRPr lang="en-US" sz="300"/>
+                    </a:p>
+                  </a:txBody>
+                  <a:tcPr marL="16513" marR="16513" marT="8257" marB="8257">
+                    <a:lnR w="12700" cap="flat" cmpd="sng" algn="ctr">
+                      <a:solidFill>
+                        <a:schemeClr val="accent1"/>
+                      </a:solidFill>
+                      <a:prstDash val="solid"/>
+                      <a:round/>
+                      <a:headEnd type="none" w="med" len="med"/>
+                      <a:tailEnd type="none" w="med" len="med"/>
+                    </a:lnR>
+                  </a:tcPr>
+                </a:tc>
+                <a:extLst>
+                  <a:ext uri="{0D108BD9-81ED-4DB2-BD59-A6C34878D82A}">
+                    <a16:rowId xmlns:a16="http://schemas.microsoft.com/office/drawing/2014/main" val="596896816"/>
+                  </a:ext>
+                </a:extLst>
+              </a:tr>
+              <a:tr h="66970">
+                <a:tc>
+                  <a:txBody>
+                    <a:bodyPr/>
+                    <a:lstStyle/>
+                    <a:p>
+                      <a:endParaRPr lang="en-US" sz="300"/>
+                    </a:p>
+                  </a:txBody>
+                  <a:tcPr marL="16513" marR="16513" marT="8257" marB="8257">
+                    <a:lnL w="12700" cap="flat" cmpd="sng" algn="ctr">
+                      <a:solidFill>
+                        <a:schemeClr val="accent1"/>
+                      </a:solidFill>
+                      <a:prstDash val="solid"/>
+                      <a:round/>
+                      <a:headEnd type="none" w="med" len="med"/>
+                      <a:tailEnd type="none" w="med" len="med"/>
+                    </a:lnL>
+                  </a:tcPr>
+                </a:tc>
+                <a:tc>
+                  <a:txBody>
+                    <a:bodyPr/>
+                    <a:lstStyle/>
+                    <a:p>
+                      <a:endParaRPr lang="en-US" sz="300"/>
+                    </a:p>
+                  </a:txBody>
+                  <a:tcPr marL="16513" marR="16513" marT="8257" marB="8257"/>
+                </a:tc>
+                <a:tc>
+                  <a:txBody>
+                    <a:bodyPr/>
+                    <a:lstStyle/>
+                    <a:p>
+                      <a:endParaRPr lang="en-US" sz="300"/>
+                    </a:p>
+                  </a:txBody>
+                  <a:tcPr marL="16513" marR="16513" marT="8257" marB="8257"/>
+                </a:tc>
+                <a:tc>
+                  <a:txBody>
+                    <a:bodyPr/>
+                    <a:lstStyle/>
+                    <a:p>
+                      <a:endParaRPr lang="en-US" sz="300"/>
+                    </a:p>
+                  </a:txBody>
+                  <a:tcPr marL="16513" marR="16513" marT="8257" marB="8257"/>
+                </a:tc>
+                <a:tc>
+                  <a:txBody>
+                    <a:bodyPr/>
+                    <a:lstStyle/>
+                    <a:p>
+                      <a:endParaRPr lang="en-US" sz="300"/>
+                    </a:p>
+                  </a:txBody>
+                  <a:tcPr marL="16513" marR="16513" marT="8257" marB="8257"/>
+                </a:tc>
+                <a:tc>
+                  <a:txBody>
+                    <a:bodyPr/>
+                    <a:lstStyle/>
+                    <a:p>
+                      <a:endParaRPr lang="en-US" sz="300"/>
+                    </a:p>
+                  </a:txBody>
+                  <a:tcPr marL="16513" marR="16513" marT="8257" marB="8257"/>
+                </a:tc>
+                <a:tc>
+                  <a:txBody>
+                    <a:bodyPr/>
+                    <a:lstStyle/>
+                    <a:p>
+                      <a:endParaRPr lang="en-US" sz="300"/>
+                    </a:p>
+                  </a:txBody>
+                  <a:tcPr marL="16513" marR="16513" marT="8257" marB="8257">
+                    <a:lnR w="12700" cap="flat" cmpd="sng" algn="ctr">
+                      <a:solidFill>
+                        <a:schemeClr val="accent1"/>
+                      </a:solidFill>
+                      <a:prstDash val="solid"/>
+                      <a:round/>
+                      <a:headEnd type="none" w="med" len="med"/>
+                      <a:tailEnd type="none" w="med" len="med"/>
+                    </a:lnR>
+                  </a:tcPr>
+                </a:tc>
+                <a:extLst>
+                  <a:ext uri="{0D108BD9-81ED-4DB2-BD59-A6C34878D82A}">
+                    <a16:rowId xmlns:a16="http://schemas.microsoft.com/office/drawing/2014/main" val="1244738521"/>
+                  </a:ext>
+                </a:extLst>
+              </a:tr>
+              <a:tr h="66970">
+                <a:tc>
+                  <a:txBody>
+                    <a:bodyPr/>
+                    <a:lstStyle/>
+                    <a:p>
+                      <a:endParaRPr lang="en-US" sz="300"/>
+                    </a:p>
+                  </a:txBody>
+                  <a:tcPr marL="16513" marR="16513" marT="8257" marB="8257">
+                    <a:lnL w="12700" cap="flat" cmpd="sng" algn="ctr">
+                      <a:solidFill>
+                        <a:schemeClr val="accent1"/>
+                      </a:solidFill>
+                      <a:prstDash val="solid"/>
+                      <a:round/>
+                      <a:headEnd type="none" w="med" len="med"/>
+                      <a:tailEnd type="none" w="med" len="med"/>
+                    </a:lnL>
+                  </a:tcPr>
+                </a:tc>
+                <a:tc>
+                  <a:txBody>
+                    <a:bodyPr/>
+                    <a:lstStyle/>
+                    <a:p>
+                      <a:endParaRPr lang="en-US" sz="300"/>
+                    </a:p>
+                  </a:txBody>
+                  <a:tcPr marL="16513" marR="16513" marT="8257" marB="8257"/>
+                </a:tc>
+                <a:tc>
+                  <a:txBody>
+                    <a:bodyPr/>
+                    <a:lstStyle/>
+                    <a:p>
+                      <a:endParaRPr lang="en-US" sz="300"/>
+                    </a:p>
+                  </a:txBody>
+                  <a:tcPr marL="16513" marR="16513" marT="8257" marB="8257"/>
+                </a:tc>
+                <a:tc>
+                  <a:txBody>
+                    <a:bodyPr/>
+                    <a:lstStyle/>
+                    <a:p>
+                      <a:endParaRPr lang="en-US" sz="300"/>
+                    </a:p>
+                  </a:txBody>
+                  <a:tcPr marL="16513" marR="16513" marT="8257" marB="8257"/>
+                </a:tc>
+                <a:tc>
+                  <a:txBody>
+                    <a:bodyPr/>
+                    <a:lstStyle/>
+                    <a:p>
+                      <a:endParaRPr lang="en-US" sz="300" dirty="0"/>
+                    </a:p>
+                  </a:txBody>
+                  <a:tcPr marL="16513" marR="16513" marT="8257" marB="8257"/>
+                </a:tc>
+                <a:tc>
+                  <a:txBody>
+                    <a:bodyPr/>
+                    <a:lstStyle/>
+                    <a:p>
+                      <a:endParaRPr lang="en-US" sz="300"/>
+                    </a:p>
+                  </a:txBody>
+                  <a:tcPr marL="16513" marR="16513" marT="8257" marB="8257"/>
+                </a:tc>
+                <a:tc>
+                  <a:txBody>
+                    <a:bodyPr/>
+                    <a:lstStyle/>
+                    <a:p>
+                      <a:endParaRPr lang="en-US" sz="300"/>
+                    </a:p>
+                  </a:txBody>
+                  <a:tcPr marL="16513" marR="16513" marT="8257" marB="8257">
+                    <a:lnR w="12700" cap="flat" cmpd="sng" algn="ctr">
+                      <a:solidFill>
+                        <a:schemeClr val="accent1"/>
+                      </a:solidFill>
+                      <a:prstDash val="solid"/>
+                      <a:round/>
+                      <a:headEnd type="none" w="med" len="med"/>
+                      <a:tailEnd type="none" w="med" len="med"/>
+                    </a:lnR>
+                  </a:tcPr>
+                </a:tc>
+                <a:extLst>
+                  <a:ext uri="{0D108BD9-81ED-4DB2-BD59-A6C34878D82A}">
+                    <a16:rowId xmlns:a16="http://schemas.microsoft.com/office/drawing/2014/main" val="2846293047"/>
+                  </a:ext>
+                </a:extLst>
+              </a:tr>
+              <a:tr h="66970">
+                <a:tc>
+                  <a:txBody>
+                    <a:bodyPr/>
+                    <a:lstStyle/>
+                    <a:p>
+                      <a:endParaRPr lang="en-US" sz="300"/>
+                    </a:p>
+                  </a:txBody>
+                  <a:tcPr marL="16513" marR="16513" marT="8257" marB="8257">
+                    <a:lnL w="12700" cap="flat" cmpd="sng" algn="ctr">
+                      <a:solidFill>
+                        <a:schemeClr val="accent1"/>
+                      </a:solidFill>
+                      <a:prstDash val="solid"/>
+                      <a:round/>
+                      <a:headEnd type="none" w="med" len="med"/>
+                      <a:tailEnd type="none" w="med" len="med"/>
+                    </a:lnL>
+                  </a:tcPr>
+                </a:tc>
+                <a:tc>
+                  <a:txBody>
+                    <a:bodyPr/>
+                    <a:lstStyle/>
+                    <a:p>
+                      <a:endParaRPr lang="en-US" sz="300"/>
+                    </a:p>
+                  </a:txBody>
+                  <a:tcPr marL="16513" marR="16513" marT="8257" marB="8257"/>
+                </a:tc>
+                <a:tc>
+                  <a:txBody>
+                    <a:bodyPr/>
+                    <a:lstStyle/>
+                    <a:p>
+                      <a:endParaRPr lang="en-US" sz="300"/>
+                    </a:p>
+                  </a:txBody>
+                  <a:tcPr marL="16513" marR="16513" marT="8257" marB="8257"/>
+                </a:tc>
+                <a:tc>
+                  <a:txBody>
+                    <a:bodyPr/>
+                    <a:lstStyle/>
+                    <a:p>
+                      <a:endParaRPr lang="en-US" sz="300"/>
+                    </a:p>
+                  </a:txBody>
+                  <a:tcPr marL="16513" marR="16513" marT="8257" marB="8257"/>
+                </a:tc>
+                <a:tc>
+                  <a:txBody>
+                    <a:bodyPr/>
+                    <a:lstStyle/>
+                    <a:p>
+                      <a:endParaRPr lang="en-US" sz="300"/>
+                    </a:p>
+                  </a:txBody>
+                  <a:tcPr marL="16513" marR="16513" marT="8257" marB="8257"/>
+                </a:tc>
+                <a:tc>
+                  <a:txBody>
+                    <a:bodyPr/>
+                    <a:lstStyle/>
+                    <a:p>
+                      <a:endParaRPr lang="en-US" sz="300"/>
+                    </a:p>
+                  </a:txBody>
+                  <a:tcPr marL="16513" marR="16513" marT="8257" marB="8257"/>
+                </a:tc>
+                <a:tc>
+                  <a:txBody>
+                    <a:bodyPr/>
+                    <a:lstStyle/>
+                    <a:p>
+                      <a:endParaRPr lang="en-US" sz="300"/>
+                    </a:p>
+                  </a:txBody>
+                  <a:tcPr marL="16513" marR="16513" marT="8257" marB="8257">
+                    <a:lnR w="12700" cap="flat" cmpd="sng" algn="ctr">
+                      <a:solidFill>
+                        <a:schemeClr val="accent1"/>
+                      </a:solidFill>
+                      <a:prstDash val="solid"/>
+                      <a:round/>
+                      <a:headEnd type="none" w="med" len="med"/>
+                      <a:tailEnd type="none" w="med" len="med"/>
+                    </a:lnR>
+                  </a:tcPr>
+                </a:tc>
+                <a:extLst>
+                  <a:ext uri="{0D108BD9-81ED-4DB2-BD59-A6C34878D82A}">
+                    <a16:rowId xmlns:a16="http://schemas.microsoft.com/office/drawing/2014/main" val="379130267"/>
+                  </a:ext>
+                </a:extLst>
+              </a:tr>
+              <a:tr h="66970">
+                <a:tc>
+                  <a:txBody>
+                    <a:bodyPr/>
+                    <a:lstStyle/>
+                    <a:p>
+                      <a:endParaRPr lang="en-US" sz="300"/>
+                    </a:p>
+                  </a:txBody>
+                  <a:tcPr marL="16513" marR="16513" marT="8257" marB="8257">
+                    <a:lnL w="12700" cap="flat" cmpd="sng" algn="ctr">
+                      <a:solidFill>
+                        <a:schemeClr val="accent1"/>
+                      </a:solidFill>
+                      <a:prstDash val="solid"/>
+                      <a:round/>
+                      <a:headEnd type="none" w="med" len="med"/>
+                      <a:tailEnd type="none" w="med" len="med"/>
+                    </a:lnL>
+                    <a:lnB w="12700" cap="flat" cmpd="sng" algn="ctr">
+                      <a:solidFill>
+                        <a:schemeClr val="accent1"/>
+                      </a:solidFill>
+                      <a:prstDash val="solid"/>
+                      <a:round/>
+                      <a:headEnd type="none" w="med" len="med"/>
+                      <a:tailEnd type="none" w="med" len="med"/>
+                    </a:lnB>
+                  </a:tcPr>
+                </a:tc>
+                <a:tc>
+                  <a:txBody>
+                    <a:bodyPr/>
+                    <a:lstStyle/>
+                    <a:p>
+                      <a:endParaRPr lang="en-US" sz="300"/>
+                    </a:p>
+                  </a:txBody>
+                  <a:tcPr marL="16513" marR="16513" marT="8257" marB="8257">
+                    <a:lnB w="12700" cap="flat" cmpd="sng" algn="ctr">
+                      <a:solidFill>
+                        <a:schemeClr val="accent1"/>
+                      </a:solidFill>
+                      <a:prstDash val="solid"/>
+                      <a:round/>
+                      <a:headEnd type="none" w="med" len="med"/>
+                      <a:tailEnd type="none" w="med" len="med"/>
+                    </a:lnB>
+                  </a:tcPr>
+                </a:tc>
+                <a:tc>
+                  <a:txBody>
+                    <a:bodyPr/>
+                    <a:lstStyle/>
+                    <a:p>
+                      <a:endParaRPr lang="en-US" sz="300"/>
+                    </a:p>
+                  </a:txBody>
+                  <a:tcPr marL="16513" marR="16513" marT="8257" marB="8257">
+                    <a:lnB w="12700" cap="flat" cmpd="sng" algn="ctr">
+                      <a:solidFill>
+                        <a:schemeClr val="accent1"/>
+                      </a:solidFill>
+                      <a:prstDash val="solid"/>
+                      <a:round/>
+                      <a:headEnd type="none" w="med" len="med"/>
+                      <a:tailEnd type="none" w="med" len="med"/>
+                    </a:lnB>
+                  </a:tcPr>
+                </a:tc>
+                <a:tc>
+                  <a:txBody>
+                    <a:bodyPr/>
+                    <a:lstStyle/>
+                    <a:p>
+                      <a:endParaRPr lang="en-US" sz="300"/>
+                    </a:p>
+                  </a:txBody>
+                  <a:tcPr marL="16513" marR="16513" marT="8257" marB="8257">
+                    <a:lnB w="12700" cap="flat" cmpd="sng" algn="ctr">
+                      <a:solidFill>
+                        <a:schemeClr val="accent1"/>
+                      </a:solidFill>
+                      <a:prstDash val="solid"/>
+                      <a:round/>
+                      <a:headEnd type="none" w="med" len="med"/>
+                      <a:tailEnd type="none" w="med" len="med"/>
+                    </a:lnB>
+                  </a:tcPr>
+                </a:tc>
+                <a:tc>
+                  <a:txBody>
+                    <a:bodyPr/>
+                    <a:lstStyle/>
+                    <a:p>
+                      <a:endParaRPr lang="en-US" sz="300"/>
+                    </a:p>
+                  </a:txBody>
+                  <a:tcPr marL="16513" marR="16513" marT="8257" marB="8257">
+                    <a:lnB w="12700" cap="flat" cmpd="sng" algn="ctr">
+                      <a:solidFill>
+                        <a:schemeClr val="accent1"/>
+                      </a:solidFill>
+                      <a:prstDash val="solid"/>
+                      <a:round/>
+                      <a:headEnd type="none" w="med" len="med"/>
+                      <a:tailEnd type="none" w="med" len="med"/>
+                    </a:lnB>
+                  </a:tcPr>
+                </a:tc>
+                <a:tc>
+                  <a:txBody>
+                    <a:bodyPr/>
+                    <a:lstStyle/>
+                    <a:p>
+                      <a:endParaRPr lang="en-US" sz="300"/>
+                    </a:p>
+                  </a:txBody>
+                  <a:tcPr marL="16513" marR="16513" marT="8257" marB="8257">
+                    <a:lnB w="12700" cap="flat" cmpd="sng" algn="ctr">
+                      <a:solidFill>
+                        <a:schemeClr val="accent1"/>
+                      </a:solidFill>
+                      <a:prstDash val="solid"/>
+                      <a:round/>
+                      <a:headEnd type="none" w="med" len="med"/>
+                      <a:tailEnd type="none" w="med" len="med"/>
+                    </a:lnB>
+                  </a:tcPr>
+                </a:tc>
+                <a:tc>
+                  <a:txBody>
+                    <a:bodyPr/>
+                    <a:lstStyle/>
+                    <a:p>
+                      <a:endParaRPr lang="en-US" sz="300" dirty="0"/>
+                    </a:p>
+                  </a:txBody>
+                  <a:tcPr marL="16513" marR="16513" marT="8257" marB="8257">
+                    <a:lnR w="12700" cap="flat" cmpd="sng" algn="ctr">
+                      <a:solidFill>
+                        <a:schemeClr val="accent1"/>
+                      </a:solidFill>
+                      <a:prstDash val="solid"/>
+                      <a:round/>
+                      <a:headEnd type="none" w="med" len="med"/>
+                      <a:tailEnd type="none" w="med" len="med"/>
+                    </a:lnR>
+                    <a:lnB w="12700" cap="flat" cmpd="sng" algn="ctr">
+                      <a:solidFill>
+                        <a:schemeClr val="accent1"/>
+                      </a:solidFill>
+                      <a:prstDash val="solid"/>
+                      <a:round/>
+                      <a:headEnd type="none" w="med" len="med"/>
+                      <a:tailEnd type="none" w="med" len="med"/>
+                    </a:lnB>
+                  </a:tcPr>
+                </a:tc>
+                <a:extLst>
+                  <a:ext uri="{0D108BD9-81ED-4DB2-BD59-A6C34878D82A}">
+                    <a16:rowId xmlns:a16="http://schemas.microsoft.com/office/drawing/2014/main" val="3116162638"/>
+                  </a:ext>
+                </a:extLst>
+              </a:tr>
+            </a:tbl>
+          </a:graphicData>
+        </a:graphic>
+      </p:graphicFrame>
+      <p:sp>
+        <p:nvSpPr>
+          <p:cNvPr id="43" name="TextBox 42">
+            <a:extLst>
+              <a:ext uri="{FF2B5EF4-FFF2-40B4-BE49-F238E27FC236}">
+                <a16:creationId xmlns:a16="http://schemas.microsoft.com/office/drawing/2014/main" id="{100BF56B-3B8F-4DDB-94CB-116F2363D568}"/>
+              </a:ext>
+            </a:extLst>
+          </p:cNvPr>
+          <p:cNvSpPr txBox="1"/>
+          <p:nvPr/>
+        </p:nvSpPr>
+        <p:spPr>
+          <a:xfrm>
+            <a:off x="125022" y="352933"/>
+            <a:ext cx="1451552" cy="369335"/>
+          </a:xfrm>
+          <a:prstGeom prst="rect">
+            <a:avLst/>
+          </a:prstGeom>
+          <a:noFill/>
+        </p:spPr>
+        <p:txBody>
+          <a:bodyPr wrap="square" rtlCol="0">
+            <a:spAutoFit/>
+          </a:bodyPr>
+          <a:lstStyle/>
+          <a:p>
+            <a:r>
+              <a:rPr lang="en-US" dirty="0"/>
+              <a:t>Apr 17, 2018</a:t>
+            </a:r>
+          </a:p>
+        </p:txBody>
+      </p:sp>
+      <p:sp>
+        <p:nvSpPr>
+          <p:cNvPr id="58" name="Isosceles Triangle 57">
+            <a:extLst>
+              <a:ext uri="{FF2B5EF4-FFF2-40B4-BE49-F238E27FC236}">
+                <a16:creationId xmlns:a16="http://schemas.microsoft.com/office/drawing/2014/main" id="{72F5771A-CF22-42D0-BC1E-20633B5F4B1F}"/>
+              </a:ext>
+            </a:extLst>
+          </p:cNvPr>
+          <p:cNvSpPr/>
+          <p:nvPr/>
+        </p:nvSpPr>
+        <p:spPr>
+          <a:xfrm rot="5400000">
+            <a:off x="4733474" y="4911875"/>
+            <a:ext cx="201292" cy="173528"/>
+          </a:xfrm>
+          <a:prstGeom prst="triangle">
+            <a:avLst/>
+          </a:prstGeom>
+          <a:solidFill>
+            <a:schemeClr val="tx1"/>
+          </a:solidFill>
+          <a:ln>
+            <a:solidFill>
+              <a:schemeClr val="tx1"/>
+            </a:solidFill>
+          </a:ln>
+        </p:spPr>
+        <p:style>
+          <a:lnRef idx="2">
+            <a:schemeClr val="accent1">
+              <a:shade val="50000"/>
+            </a:schemeClr>
+          </a:lnRef>
+          <a:fillRef idx="1">
+            <a:schemeClr val="accent1"/>
+          </a:fillRef>
+          <a:effectRef idx="0">
+            <a:schemeClr val="accent1"/>
+          </a:effectRef>
+          <a:fontRef idx="minor">
+            <a:schemeClr val="lt1"/>
+          </a:fontRef>
+        </p:style>
+        <p:txBody>
+          <a:bodyPr rtlCol="0" anchor="ctr"/>
+          <a:lstStyle/>
+          <a:p>
+            <a:pPr algn="ctr"/>
+            <a:endParaRPr lang="en-US"/>
+          </a:p>
+        </p:txBody>
+      </p:sp>
+      <p:sp>
+        <p:nvSpPr>
+          <p:cNvPr id="22" name="TextBox 21">
+            <a:extLst>
+              <a:ext uri="{FF2B5EF4-FFF2-40B4-BE49-F238E27FC236}">
+                <a16:creationId xmlns:a16="http://schemas.microsoft.com/office/drawing/2014/main" id="{490394CC-015F-46B9-92A7-C6D119FD0D0D}"/>
+              </a:ext>
+            </a:extLst>
+          </p:cNvPr>
+          <p:cNvSpPr txBox="1"/>
+          <p:nvPr/>
+        </p:nvSpPr>
+        <p:spPr>
+          <a:xfrm>
+            <a:off x="10387651" y="808709"/>
+            <a:ext cx="1499669" cy="1200329"/>
+          </a:xfrm>
+          <a:prstGeom prst="rect">
+            <a:avLst/>
+          </a:prstGeom>
+          <a:solidFill>
+            <a:schemeClr val="bg1"/>
+          </a:solidFill>
+          <a:ln>
+            <a:solidFill>
+              <a:schemeClr val="bg1">
+                <a:lumMod val="75000"/>
+              </a:schemeClr>
+            </a:solidFill>
+          </a:ln>
+        </p:spPr>
+        <p:txBody>
+          <a:bodyPr wrap="square" rtlCol="0">
+            <a:spAutoFit/>
+          </a:bodyPr>
+          <a:lstStyle/>
+          <a:p>
+            <a:r>
+              <a:rPr lang="en-US" dirty="0"/>
+              <a:t>Account Info</a:t>
+            </a:r>
+          </a:p>
+          <a:p>
+            <a:r>
+              <a:rPr lang="en-US" dirty="0"/>
+              <a:t>History</a:t>
+            </a:r>
+          </a:p>
+          <a:p>
+            <a:r>
+              <a:rPr lang="en-US" dirty="0"/>
+              <a:t>Quizzes</a:t>
+            </a:r>
+          </a:p>
+          <a:p>
+            <a:r>
+              <a:rPr lang="en-US" dirty="0"/>
+              <a:t>Sign Out</a:t>
+            </a:r>
+          </a:p>
+        </p:txBody>
+      </p:sp>
+    </p:spTree>
+    <p:extLst>
+      <p:ext uri="{BB962C8B-B14F-4D97-AF65-F5344CB8AC3E}">
+        <p14:creationId xmlns:p14="http://schemas.microsoft.com/office/powerpoint/2010/main" val="2613338930"/>
+      </p:ext>
+    </p:extLst>
+  </p:cSld>
+  <p:clrMapOvr>
+    <a:masterClrMapping/>
+  </p:clrMapOvr>
+</p:sld>
+</file>
+
+<file path=ppt/slides/slide11.xml><?xml version="1.0" encoding="utf-8"?>
+<p:sld xmlns:a="http://schemas.openxmlformats.org/drawingml/2006/main" xmlns:r="http://schemas.openxmlformats.org/officeDocument/2006/relationships" xmlns:p="http://schemas.openxmlformats.org/presentationml/2006/main">
+  <p:cSld>
+    <p:spTree>
+      <p:nvGrpSpPr>
+        <p:cNvPr id="1" name=""/>
+        <p:cNvGrpSpPr/>
+        <p:nvPr/>
+      </p:nvGrpSpPr>
+      <p:grpSpPr>
+        <a:xfrm>
+          <a:off x="0" y="0"/>
+          <a:ext cx="0" cy="0"/>
+          <a:chOff x="0" y="0"/>
+          <a:chExt cx="0" cy="0"/>
+        </a:xfrm>
+      </p:grpSpPr>
       <p:sp>
         <p:nvSpPr>
           <p:cNvPr id="5" name="Rectangle 4">
@@ -8154,7 +10380,7 @@
 </p:sld>
 </file>
 
-<file path=ppt/slides/slide11.xml><?xml version="1.0" encoding="utf-8"?>
+<file path=ppt/slides/slide12.xml><?xml version="1.0" encoding="utf-8"?>
 <p:sld xmlns:a="http://schemas.openxmlformats.org/drawingml/2006/main" xmlns:r="http://schemas.openxmlformats.org/officeDocument/2006/relationships" xmlns:p="http://schemas.openxmlformats.org/presentationml/2006/main">
   <p:cSld>
     <p:spTree>
@@ -8645,7 +10871,7 @@
 </p:sld>
 </file>
 
-<file path=ppt/slides/slide12.xml><?xml version="1.0" encoding="utf-8"?>
+<file path=ppt/slides/slide13.xml><?xml version="1.0" encoding="utf-8"?>
 <p:sld xmlns:a="http://schemas.openxmlformats.org/drawingml/2006/main" xmlns:r="http://schemas.openxmlformats.org/officeDocument/2006/relationships" xmlns:p="http://schemas.openxmlformats.org/presentationml/2006/main">
   <p:cSld>
     <p:spTree>
@@ -9093,7 +11319,7 @@
 </p:sld>
 </file>
 
-<file path=ppt/slides/slide13.xml><?xml version="1.0" encoding="utf-8"?>
+<file path=ppt/slides/slide14.xml><?xml version="1.0" encoding="utf-8"?>
 <p:sld xmlns:a="http://schemas.openxmlformats.org/drawingml/2006/main" xmlns:r="http://schemas.openxmlformats.org/officeDocument/2006/relationships" xmlns:p="http://schemas.openxmlformats.org/presentationml/2006/main">
   <p:cSld>
     <p:spTree>
@@ -9538,7 +11764,7 @@
 </p:sld>
 </file>
 
-<file path=ppt/slides/slide14.xml><?xml version="1.0" encoding="utf-8"?>
+<file path=ppt/slides/slide15.xml><?xml version="1.0" encoding="utf-8"?>
 <p:sld xmlns:a="http://schemas.openxmlformats.org/drawingml/2006/main" xmlns:r="http://schemas.openxmlformats.org/officeDocument/2006/relationships" xmlns:p="http://schemas.openxmlformats.org/presentationml/2006/main">
   <p:cSld>
     <p:spTree>
@@ -10228,7 +12454,7 @@
 </p:sld>
 </file>
 
-<file path=ppt/slides/slide15.xml><?xml version="1.0" encoding="utf-8"?>
+<file path=ppt/slides/slide16.xml><?xml version="1.0" encoding="utf-8"?>
 <p:sld xmlns:a="http://schemas.openxmlformats.org/drawingml/2006/main" xmlns:r="http://schemas.openxmlformats.org/officeDocument/2006/relationships" xmlns:p="http://schemas.openxmlformats.org/presentationml/2006/main">
   <p:cSld>
     <p:spTree>
@@ -11021,7 +13247,7 @@
 </p:sld>
 </file>
 
-<file path=ppt/slides/slide16.xml><?xml version="1.0" encoding="utf-8"?>
+<file path=ppt/slides/slide17.xml><?xml version="1.0" encoding="utf-8"?>
 <p:sld xmlns:a="http://schemas.openxmlformats.org/drawingml/2006/main" xmlns:r="http://schemas.openxmlformats.org/officeDocument/2006/relationships" xmlns:p="http://schemas.openxmlformats.org/presentationml/2006/main">
   <p:cSld>
     <p:spTree>
@@ -25598,7 +27824,7 @@
         </p:nvSpPr>
         <p:spPr>
           <a:xfrm>
-            <a:off x="4320168" y="4210711"/>
+            <a:off x="4303877" y="4580047"/>
             <a:ext cx="1099525" cy="461665"/>
           </a:xfrm>
           <a:prstGeom prst="rect">
@@ -25639,7 +27865,7 @@
         </p:nvSpPr>
         <p:spPr>
           <a:xfrm>
-            <a:off x="6467912" y="4210711"/>
+            <a:off x="6392290" y="4580046"/>
             <a:ext cx="1099525" cy="461665"/>
           </a:xfrm>
           <a:prstGeom prst="rect">
@@ -25739,6 +27965,47 @@
           </a:prstGeom>
         </p:spPr>
       </p:pic>
+      <p:sp>
+        <p:nvSpPr>
+          <p:cNvPr id="7" name="TextBox 6">
+            <a:extLst>
+              <a:ext uri="{FF2B5EF4-FFF2-40B4-BE49-F238E27FC236}">
+                <a16:creationId xmlns:a16="http://schemas.microsoft.com/office/drawing/2014/main" id="{F14AED0F-EB24-4510-B165-8ABEA5F2A47D}"/>
+              </a:ext>
+            </a:extLst>
+          </p:cNvPr>
+          <p:cNvSpPr txBox="1"/>
+          <p:nvPr/>
+        </p:nvSpPr>
+        <p:spPr>
+          <a:xfrm>
+            <a:off x="4395790" y="4045279"/>
+            <a:ext cx="3096025" cy="369332"/>
+          </a:xfrm>
+          <a:prstGeom prst="rect">
+            <a:avLst/>
+          </a:prstGeom>
+          <a:noFill/>
+        </p:spPr>
+        <p:txBody>
+          <a:bodyPr wrap="square" rtlCol="0">
+            <a:spAutoFit/>
+          </a:bodyPr>
+          <a:lstStyle/>
+          <a:p>
+            <a:r>
+              <a:rPr lang="en-US" dirty="0">
+                <a:solidFill>
+                  <a:schemeClr val="accent2">
+                    <a:lumMod val="75000"/>
+                  </a:schemeClr>
+                </a:solidFill>
+              </a:rPr>
+              <a:t>Forgot password?</a:t>
+            </a:r>
+          </a:p>
+        </p:txBody>
+      </p:sp>
     </p:spTree>
     <p:extLst>
       <p:ext uri="{BB962C8B-B14F-4D97-AF65-F5344CB8AC3E}">
@@ -26378,440 +28645,22 @@
           <a:chExt cx="0" cy="0"/>
         </a:xfrm>
       </p:grpSpPr>
-      <p:graphicFrame>
-        <p:nvGraphicFramePr>
-          <p:cNvPr id="56" name="Table 55">
-            <a:extLst>
-              <a:ext uri="{FF2B5EF4-FFF2-40B4-BE49-F238E27FC236}">
-                <a16:creationId xmlns:a16="http://schemas.microsoft.com/office/drawing/2014/main" id="{57835D6E-6815-41BE-8F17-C908999B7AFB}"/>
-              </a:ext>
-            </a:extLst>
-          </p:cNvPr>
-          <p:cNvGraphicFramePr>
-            <a:graphicFrameLocks noGrp="1"/>
-          </p:cNvGraphicFramePr>
-          <p:nvPr/>
-        </p:nvGraphicFramePr>
-        <p:xfrm>
-          <a:off x="0" y="1055226"/>
-          <a:ext cx="12191998" cy="555460"/>
-        </p:xfrm>
-        <a:graphic>
-          <a:graphicData uri="http://schemas.openxmlformats.org/drawingml/2006/table">
-            <a:tbl>
-              <a:tblPr firstRow="1" bandRow="1">
-                <a:tableStyleId>{5C22544A-7EE6-4342-B048-85BDC9FD1C3A}</a:tableStyleId>
-              </a:tblPr>
-              <a:tblGrid>
-                <a:gridCol w="1741714">
-                  <a:extLst>
-                    <a:ext uri="{9D8B030D-6E8A-4147-A177-3AD203B41FA5}">
-                      <a16:colId xmlns:a16="http://schemas.microsoft.com/office/drawing/2014/main" val="2931865132"/>
-                    </a:ext>
-                  </a:extLst>
-                </a:gridCol>
-                <a:gridCol w="1741714">
-                  <a:extLst>
-                    <a:ext uri="{9D8B030D-6E8A-4147-A177-3AD203B41FA5}">
-                      <a16:colId xmlns:a16="http://schemas.microsoft.com/office/drawing/2014/main" val="1520592850"/>
-                    </a:ext>
-                  </a:extLst>
-                </a:gridCol>
-                <a:gridCol w="1741714">
-                  <a:extLst>
-                    <a:ext uri="{9D8B030D-6E8A-4147-A177-3AD203B41FA5}">
-                      <a16:colId xmlns:a16="http://schemas.microsoft.com/office/drawing/2014/main" val="1937029407"/>
-                    </a:ext>
-                  </a:extLst>
-                </a:gridCol>
-                <a:gridCol w="1741714">
-                  <a:extLst>
-                    <a:ext uri="{9D8B030D-6E8A-4147-A177-3AD203B41FA5}">
-                      <a16:colId xmlns:a16="http://schemas.microsoft.com/office/drawing/2014/main" val="4117769092"/>
-                    </a:ext>
-                  </a:extLst>
-                </a:gridCol>
-                <a:gridCol w="1741714">
-                  <a:extLst>
-                    <a:ext uri="{9D8B030D-6E8A-4147-A177-3AD203B41FA5}">
-                      <a16:colId xmlns:a16="http://schemas.microsoft.com/office/drawing/2014/main" val="2770334083"/>
-                    </a:ext>
-                  </a:extLst>
-                </a:gridCol>
-                <a:gridCol w="1741714">
-                  <a:extLst>
-                    <a:ext uri="{9D8B030D-6E8A-4147-A177-3AD203B41FA5}">
-                      <a16:colId xmlns:a16="http://schemas.microsoft.com/office/drawing/2014/main" val="1558791370"/>
-                    </a:ext>
-                  </a:extLst>
-                </a:gridCol>
-                <a:gridCol w="1741714">
-                  <a:extLst>
-                    <a:ext uri="{9D8B030D-6E8A-4147-A177-3AD203B41FA5}">
-                      <a16:colId xmlns:a16="http://schemas.microsoft.com/office/drawing/2014/main" val="51519993"/>
-                    </a:ext>
-                  </a:extLst>
-                </a:gridCol>
-              </a:tblGrid>
-              <a:tr h="555460">
-                <a:tc>
-                  <a:txBody>
-                    <a:bodyPr/>
-                    <a:lstStyle/>
-                    <a:p>
-                      <a:pPr algn="r"/>
-                      <a:r>
-                        <a:rPr lang="en-US" sz="1600" dirty="0">
-                          <a:solidFill>
-                            <a:schemeClr val="tx1"/>
-                          </a:solidFill>
-                        </a:rPr>
-                        <a:t>Spanish</a:t>
-                      </a:r>
-                    </a:p>
-                  </a:txBody>
-                  <a:tcPr marL="136963" marR="136963" marT="68481" marB="68481" anchor="ctr">
-                    <a:lnT w="12700" cap="flat" cmpd="sng" algn="ctr">
-                      <a:solidFill>
-                        <a:schemeClr val="accent1"/>
-                      </a:solidFill>
-                      <a:prstDash val="solid"/>
-                      <a:round/>
-                      <a:headEnd type="none" w="med" len="med"/>
-                      <a:tailEnd type="none" w="med" len="med"/>
-                    </a:lnT>
-                    <a:lnB w="12700" cap="flat" cmpd="sng" algn="ctr">
-                      <a:noFill/>
-                      <a:prstDash val="solid"/>
-                      <a:round/>
-                      <a:headEnd type="none" w="med" len="med"/>
-                      <a:tailEnd type="none" w="med" len="med"/>
-                    </a:lnB>
-                    <a:solidFill>
-                      <a:schemeClr val="bg1"/>
-                    </a:solidFill>
-                  </a:tcPr>
-                </a:tc>
-                <a:tc>
-                  <a:txBody>
-                    <a:bodyPr/>
-                    <a:lstStyle/>
-                    <a:p>
-                      <a:pPr algn="r"/>
-                      <a:r>
-                        <a:rPr lang="en-US" sz="1600" dirty="0">
-                          <a:solidFill>
-                            <a:schemeClr val="tx1"/>
-                          </a:solidFill>
-                        </a:rPr>
-                        <a:t>French</a:t>
-                      </a:r>
-                    </a:p>
-                  </a:txBody>
-                  <a:tcPr marL="136963" marR="136963" marT="68481" marB="68481" anchor="ctr">
-                    <a:lnT w="12700" cap="flat" cmpd="sng" algn="ctr">
-                      <a:solidFill>
-                        <a:schemeClr val="accent1"/>
-                      </a:solidFill>
-                      <a:prstDash val="solid"/>
-                      <a:round/>
-                      <a:headEnd type="none" w="med" len="med"/>
-                      <a:tailEnd type="none" w="med" len="med"/>
-                    </a:lnT>
-                    <a:lnB w="12700" cap="flat" cmpd="sng" algn="ctr">
-                      <a:solidFill>
-                        <a:schemeClr val="accent1"/>
-                      </a:solidFill>
-                      <a:prstDash val="solid"/>
-                      <a:round/>
-                      <a:headEnd type="none" w="med" len="med"/>
-                      <a:tailEnd type="none" w="med" len="med"/>
-                    </a:lnB>
-                    <a:solidFill>
-                      <a:schemeClr val="accent1">
-                        <a:lumMod val="40000"/>
-                        <a:lumOff val="60000"/>
-                      </a:schemeClr>
-                    </a:solidFill>
-                  </a:tcPr>
-                </a:tc>
-                <a:tc>
-                  <a:txBody>
-                    <a:bodyPr/>
-                    <a:lstStyle/>
-                    <a:p>
-                      <a:pPr algn="r"/>
-                      <a:r>
-                        <a:rPr lang="en-US" sz="1600" dirty="0">
-                          <a:solidFill>
-                            <a:schemeClr val="tx1"/>
-                          </a:solidFill>
-                        </a:rPr>
-                        <a:t>Italian</a:t>
-                      </a:r>
-                    </a:p>
-                  </a:txBody>
-                  <a:tcPr marL="136963" marR="136963" marT="68481" marB="68481" anchor="ctr">
-                    <a:lnT w="12700" cap="flat" cmpd="sng" algn="ctr">
-                      <a:solidFill>
-                        <a:schemeClr val="accent1"/>
-                      </a:solidFill>
-                      <a:prstDash val="solid"/>
-                      <a:round/>
-                      <a:headEnd type="none" w="med" len="med"/>
-                      <a:tailEnd type="none" w="med" len="med"/>
-                    </a:lnT>
-                    <a:lnB w="12700" cap="flat" cmpd="sng" algn="ctr">
-                      <a:solidFill>
-                        <a:schemeClr val="accent1"/>
-                      </a:solidFill>
-                      <a:prstDash val="solid"/>
-                      <a:round/>
-                      <a:headEnd type="none" w="med" len="med"/>
-                      <a:tailEnd type="none" w="med" len="med"/>
-                    </a:lnB>
-                    <a:solidFill>
-                      <a:schemeClr val="accent1">
-                        <a:lumMod val="40000"/>
-                        <a:lumOff val="60000"/>
-                      </a:schemeClr>
-                    </a:solidFill>
-                  </a:tcPr>
-                </a:tc>
-                <a:tc>
-                  <a:txBody>
-                    <a:bodyPr/>
-                    <a:lstStyle/>
-                    <a:p>
-                      <a:pPr algn="r"/>
-                      <a:r>
-                        <a:rPr lang="en-US" sz="1600" dirty="0">
-                          <a:solidFill>
-                            <a:schemeClr val="tx1"/>
-                          </a:solidFill>
-                        </a:rPr>
-                        <a:t>Japanese</a:t>
-                      </a:r>
-                    </a:p>
-                  </a:txBody>
-                  <a:tcPr marL="136963" marR="136963" marT="68481" marB="68481" anchor="ctr">
-                    <a:lnT w="12700" cap="flat" cmpd="sng" algn="ctr">
-                      <a:solidFill>
-                        <a:schemeClr val="accent1"/>
-                      </a:solidFill>
-                      <a:prstDash val="solid"/>
-                      <a:round/>
-                      <a:headEnd type="none" w="med" len="med"/>
-                      <a:tailEnd type="none" w="med" len="med"/>
-                    </a:lnT>
-                    <a:lnB w="12700" cap="flat" cmpd="sng" algn="ctr">
-                      <a:solidFill>
-                        <a:schemeClr val="accent1"/>
-                      </a:solidFill>
-                      <a:prstDash val="solid"/>
-                      <a:round/>
-                      <a:headEnd type="none" w="med" len="med"/>
-                      <a:tailEnd type="none" w="med" len="med"/>
-                    </a:lnB>
-                    <a:solidFill>
-                      <a:schemeClr val="accent1">
-                        <a:lumMod val="40000"/>
-                        <a:lumOff val="60000"/>
-                      </a:schemeClr>
-                    </a:solidFill>
-                  </a:tcPr>
-                </a:tc>
-                <a:tc>
-                  <a:txBody>
-                    <a:bodyPr/>
-                    <a:lstStyle/>
-                    <a:p>
-                      <a:pPr algn="r"/>
-                      <a:r>
-                        <a:rPr lang="en-US" sz="1600" dirty="0">
-                          <a:solidFill>
-                            <a:schemeClr val="tx1"/>
-                          </a:solidFill>
-                        </a:rPr>
-                        <a:t>German</a:t>
-                      </a:r>
-                    </a:p>
-                  </a:txBody>
-                  <a:tcPr marL="136963" marR="136963" marT="68481" marB="68481" anchor="ctr">
-                    <a:lnT w="12700" cap="flat" cmpd="sng" algn="ctr">
-                      <a:solidFill>
-                        <a:schemeClr val="accent1"/>
-                      </a:solidFill>
-                      <a:prstDash val="solid"/>
-                      <a:round/>
-                      <a:headEnd type="none" w="med" len="med"/>
-                      <a:tailEnd type="none" w="med" len="med"/>
-                    </a:lnT>
-                    <a:lnB w="12700" cap="flat" cmpd="sng" algn="ctr">
-                      <a:solidFill>
-                        <a:schemeClr val="accent1"/>
-                      </a:solidFill>
-                      <a:prstDash val="solid"/>
-                      <a:round/>
-                      <a:headEnd type="none" w="med" len="med"/>
-                      <a:tailEnd type="none" w="med" len="med"/>
-                    </a:lnB>
-                    <a:solidFill>
-                      <a:schemeClr val="accent1">
-                        <a:lumMod val="40000"/>
-                        <a:lumOff val="60000"/>
-                      </a:schemeClr>
-                    </a:solidFill>
-                  </a:tcPr>
-                </a:tc>
-                <a:tc>
-                  <a:txBody>
-                    <a:bodyPr/>
-                    <a:lstStyle/>
-                    <a:p>
-                      <a:pPr algn="r"/>
-                      <a:r>
-                        <a:rPr lang="en-US" sz="1600" dirty="0">
-                          <a:solidFill>
-                            <a:schemeClr val="tx1"/>
-                          </a:solidFill>
-                        </a:rPr>
-                        <a:t>Chinese</a:t>
-                      </a:r>
-                    </a:p>
-                  </a:txBody>
-                  <a:tcPr marL="136963" marR="136963" marT="68481" marB="68481" anchor="ctr">
-                    <a:lnT w="12700" cap="flat" cmpd="sng" algn="ctr">
-                      <a:solidFill>
-                        <a:schemeClr val="accent1"/>
-                      </a:solidFill>
-                      <a:prstDash val="solid"/>
-                      <a:round/>
-                      <a:headEnd type="none" w="med" len="med"/>
-                      <a:tailEnd type="none" w="med" len="med"/>
-                    </a:lnT>
-                    <a:lnB w="12700" cap="flat" cmpd="sng" algn="ctr">
-                      <a:solidFill>
-                        <a:schemeClr val="accent1"/>
-                      </a:solidFill>
-                      <a:prstDash val="solid"/>
-                      <a:round/>
-                      <a:headEnd type="none" w="med" len="med"/>
-                      <a:tailEnd type="none" w="med" len="med"/>
-                    </a:lnB>
-                    <a:solidFill>
-                      <a:schemeClr val="accent1">
-                        <a:lumMod val="40000"/>
-                        <a:lumOff val="60000"/>
-                      </a:schemeClr>
-                    </a:solidFill>
-                  </a:tcPr>
-                </a:tc>
-                <a:tc>
-                  <a:txBody>
-                    <a:bodyPr/>
-                    <a:lstStyle/>
-                    <a:p>
-                      <a:pPr algn="r"/>
-                      <a:r>
-                        <a:rPr lang="en-US" sz="1600" dirty="0">
-                          <a:solidFill>
-                            <a:schemeClr val="tx1"/>
-                          </a:solidFill>
-                        </a:rPr>
-                        <a:t>Russian</a:t>
-                      </a:r>
-                    </a:p>
-                  </a:txBody>
-                  <a:tcPr marL="136963" marR="136963" marT="68481" marB="68481" anchor="ctr">
-                    <a:lnT w="12700" cap="flat" cmpd="sng" algn="ctr">
-                      <a:solidFill>
-                        <a:schemeClr val="accent1"/>
-                      </a:solidFill>
-                      <a:prstDash val="solid"/>
-                      <a:round/>
-                      <a:headEnd type="none" w="med" len="med"/>
-                      <a:tailEnd type="none" w="med" len="med"/>
-                    </a:lnT>
-                    <a:lnB w="12700" cap="flat" cmpd="sng" algn="ctr">
-                      <a:solidFill>
-                        <a:schemeClr val="accent1"/>
-                      </a:solidFill>
-                      <a:prstDash val="solid"/>
-                      <a:round/>
-                      <a:headEnd type="none" w="med" len="med"/>
-                      <a:tailEnd type="none" w="med" len="med"/>
-                    </a:lnB>
-                    <a:solidFill>
-                      <a:schemeClr val="accent1">
-                        <a:lumMod val="40000"/>
-                        <a:lumOff val="60000"/>
-                      </a:schemeClr>
-                    </a:solidFill>
-                  </a:tcPr>
-                </a:tc>
-                <a:extLst>
-                  <a:ext uri="{0D108BD9-81ED-4DB2-BD59-A6C34878D82A}">
-                    <a16:rowId xmlns:a16="http://schemas.microsoft.com/office/drawing/2014/main" val="2137538351"/>
-                  </a:ext>
-                </a:extLst>
-              </a:tr>
-            </a:tbl>
-          </a:graphicData>
-        </a:graphic>
-      </p:graphicFrame>
       <p:sp>
         <p:nvSpPr>
-          <p:cNvPr id="37" name="TextBox 36">
-            <a:extLst>
-              <a:ext uri="{FF2B5EF4-FFF2-40B4-BE49-F238E27FC236}">
-                <a16:creationId xmlns:a16="http://schemas.microsoft.com/office/drawing/2014/main" id="{359BD0E4-5CCB-42F9-B6EF-FEBBFED72E1E}"/>
-              </a:ext>
-            </a:extLst>
-          </p:cNvPr>
-          <p:cNvSpPr txBox="1"/>
+          <p:cNvPr id="5" name="Rectangle 4">
+            <a:extLst>
+              <a:ext uri="{FF2B5EF4-FFF2-40B4-BE49-F238E27FC236}">
+                <a16:creationId xmlns:a16="http://schemas.microsoft.com/office/drawing/2014/main" id="{0D822D50-D86B-46BC-890B-EBEC2097749A}"/>
+              </a:ext>
+            </a:extLst>
+          </p:cNvPr>
+          <p:cNvSpPr/>
           <p:nvPr/>
         </p:nvSpPr>
         <p:spPr>
           <a:xfrm>
-            <a:off x="3255919" y="1968667"/>
-            <a:ext cx="5680160" cy="2215991"/>
-          </a:xfrm>
-          <a:prstGeom prst="rect">
-            <a:avLst/>
-          </a:prstGeom>
-          <a:noFill/>
-        </p:spPr>
-        <p:txBody>
-          <a:bodyPr wrap="square" rtlCol="0">
-            <a:spAutoFit/>
-          </a:bodyPr>
-          <a:lstStyle/>
-          <a:p>
-            <a:pPr algn="ctr"/>
-            <a:r>
-              <a:rPr lang="en-US" sz="13800" dirty="0"/>
-              <a:t>Loren</a:t>
-            </a:r>
-          </a:p>
-        </p:txBody>
-      </p:sp>
-      <p:sp>
-        <p:nvSpPr>
-          <p:cNvPr id="36" name="TextBox 35">
-            <a:extLst>
-              <a:ext uri="{FF2B5EF4-FFF2-40B4-BE49-F238E27FC236}">
-                <a16:creationId xmlns:a16="http://schemas.microsoft.com/office/drawing/2014/main" id="{DCD42E02-C8BC-42D3-AB93-1215461355F9}"/>
-              </a:ext>
-            </a:extLst>
-          </p:cNvPr>
-          <p:cNvSpPr txBox="1"/>
-          <p:nvPr/>
-        </p:nvSpPr>
-        <p:spPr>
-          <a:xfrm>
-            <a:off x="8389" y="4310493"/>
-            <a:ext cx="5342974" cy="461665"/>
+            <a:off x="2831608" y="1182848"/>
+            <a:ext cx="6056851" cy="5675152"/>
           </a:xfrm>
           <a:prstGeom prst="rect">
             <a:avLst/>
@@ -26822,410 +28671,32 @@
               <a:lumOff val="80000"/>
             </a:schemeClr>
           </a:solidFill>
+          <a:ln>
+            <a:noFill/>
+          </a:ln>
         </p:spPr>
+        <p:style>
+          <a:lnRef idx="2">
+            <a:schemeClr val="accent1">
+              <a:shade val="50000"/>
+            </a:schemeClr>
+          </a:lnRef>
+          <a:fillRef idx="1">
+            <a:schemeClr val="accent1"/>
+          </a:fillRef>
+          <a:effectRef idx="0">
+            <a:schemeClr val="accent1"/>
+          </a:effectRef>
+          <a:fontRef idx="minor">
+            <a:schemeClr val="lt1"/>
+          </a:fontRef>
+        </p:style>
         <p:txBody>
-          <a:bodyPr wrap="square" rtlCol="0">
-            <a:spAutoFit/>
-          </a:bodyPr>
+          <a:bodyPr rtlCol="0" anchor="ctr"/>
           <a:lstStyle/>
           <a:p>
-            <a:r>
-              <a:rPr lang="en-US" sz="2400" dirty="0"/>
-              <a:t>Pronunciation</a:t>
-            </a:r>
-          </a:p>
-        </p:txBody>
-      </p:sp>
-      <p:sp>
-        <p:nvSpPr>
-          <p:cNvPr id="39" name="TextBox 38">
-            <a:extLst>
-              <a:ext uri="{FF2B5EF4-FFF2-40B4-BE49-F238E27FC236}">
-                <a16:creationId xmlns:a16="http://schemas.microsoft.com/office/drawing/2014/main" id="{D24F5E27-C734-4DA1-83A2-C0B5674AEC4A}"/>
-              </a:ext>
-            </a:extLst>
-          </p:cNvPr>
-          <p:cNvSpPr txBox="1"/>
-          <p:nvPr/>
-        </p:nvSpPr>
-        <p:spPr>
-          <a:xfrm>
-            <a:off x="6832246" y="4310492"/>
-            <a:ext cx="5351363" cy="461665"/>
-          </a:xfrm>
-          <a:prstGeom prst="rect">
-            <a:avLst/>
-          </a:prstGeom>
-          <a:solidFill>
-            <a:schemeClr val="accent1">
-              <a:lumMod val="20000"/>
-              <a:lumOff val="80000"/>
-            </a:schemeClr>
-          </a:solidFill>
-        </p:spPr>
-        <p:txBody>
-          <a:bodyPr wrap="square" rtlCol="0">
-            <a:spAutoFit/>
-          </a:bodyPr>
-          <a:lstStyle/>
-          <a:p>
-            <a:r>
-              <a:rPr lang="en-US" sz="2400" dirty="0"/>
-              <a:t>Meaning &amp; Usage</a:t>
-            </a:r>
-          </a:p>
-        </p:txBody>
-      </p:sp>
-      <p:sp>
-        <p:nvSpPr>
-          <p:cNvPr id="38" name="TextBox 37">
-            <a:extLst>
-              <a:ext uri="{FF2B5EF4-FFF2-40B4-BE49-F238E27FC236}">
-                <a16:creationId xmlns:a16="http://schemas.microsoft.com/office/drawing/2014/main" id="{DE49F9D3-B58E-41B0-B0CA-440894B824A7}"/>
-              </a:ext>
-            </a:extLst>
-          </p:cNvPr>
-          <p:cNvSpPr txBox="1"/>
-          <p:nvPr/>
-        </p:nvSpPr>
-        <p:spPr>
-          <a:xfrm>
-            <a:off x="0" y="4772157"/>
-            <a:ext cx="5342974" cy="830997"/>
-          </a:xfrm>
-          <a:prstGeom prst="rect">
-            <a:avLst/>
-          </a:prstGeom>
-          <a:noFill/>
-        </p:spPr>
-        <p:txBody>
-          <a:bodyPr wrap="square" rtlCol="0">
-            <a:spAutoFit/>
-          </a:bodyPr>
-          <a:lstStyle/>
-          <a:p>
-            <a:r>
-              <a:rPr lang="en-US" sz="2400" dirty="0"/>
-              <a:t>Phonetic </a:t>
-            </a:r>
-            <a:r>
-              <a:rPr lang="en-US" sz="2400" dirty="0" err="1"/>
-              <a:t>pronounciation</a:t>
-            </a:r>
-            <a:r>
-              <a:rPr lang="en-US" sz="2400" dirty="0"/>
-              <a:t>: /ˈ</a:t>
-            </a:r>
-            <a:r>
-              <a:rPr lang="en-US" sz="2400" dirty="0" err="1"/>
-              <a:t>lo.ɾɛn</a:t>
-            </a:r>
-            <a:r>
-              <a:rPr lang="en-US" sz="2400" dirty="0"/>
-              <a:t>/</a:t>
-            </a:r>
-          </a:p>
-          <a:p>
-            <a:r>
-              <a:rPr lang="en-US" sz="2400" dirty="0"/>
-              <a:t>English simulation: Lo-</a:t>
-            </a:r>
-            <a:r>
-              <a:rPr lang="en-US" sz="2400" dirty="0" err="1"/>
-              <a:t>ren</a:t>
-            </a:r>
-            <a:endParaRPr lang="en-US" sz="2400" dirty="0"/>
-          </a:p>
-        </p:txBody>
-      </p:sp>
-      <p:sp>
-        <p:nvSpPr>
-          <p:cNvPr id="40" name="TextBox 39">
-            <a:extLst>
-              <a:ext uri="{FF2B5EF4-FFF2-40B4-BE49-F238E27FC236}">
-                <a16:creationId xmlns:a16="http://schemas.microsoft.com/office/drawing/2014/main" id="{C3D2043A-F3CD-42C5-8924-931236B9F08F}"/>
-              </a:ext>
-            </a:extLst>
-          </p:cNvPr>
-          <p:cNvSpPr txBox="1"/>
-          <p:nvPr/>
-        </p:nvSpPr>
-        <p:spPr>
-          <a:xfrm>
-            <a:off x="6832246" y="4772157"/>
-            <a:ext cx="5351363" cy="2031325"/>
-          </a:xfrm>
-          <a:prstGeom prst="rect">
-            <a:avLst/>
-          </a:prstGeom>
-          <a:noFill/>
-        </p:spPr>
-        <p:txBody>
-          <a:bodyPr wrap="square" rtlCol="0">
-            <a:spAutoFit/>
-          </a:bodyPr>
-          <a:lstStyle/>
-          <a:p>
-            <a:r>
-              <a:rPr lang="en-US" dirty="0"/>
-              <a:t>Lorem ipsum dolor sit </a:t>
-            </a:r>
-            <a:r>
-              <a:rPr lang="en-US" dirty="0" err="1"/>
-              <a:t>amet</a:t>
-            </a:r>
-            <a:r>
-              <a:rPr lang="en-US" dirty="0"/>
-              <a:t>, </a:t>
-            </a:r>
-            <a:r>
-              <a:rPr lang="en-US" dirty="0" err="1"/>
-              <a:t>consectetur</a:t>
-            </a:r>
-            <a:r>
-              <a:rPr lang="en-US" dirty="0"/>
-              <a:t> </a:t>
-            </a:r>
-            <a:r>
-              <a:rPr lang="en-US" dirty="0" err="1"/>
-              <a:t>adipiscing</a:t>
-            </a:r>
-            <a:r>
-              <a:rPr lang="en-US" dirty="0"/>
-              <a:t> </a:t>
-            </a:r>
-            <a:r>
-              <a:rPr lang="en-US" dirty="0" err="1"/>
-              <a:t>elit</a:t>
-            </a:r>
-            <a:r>
-              <a:rPr lang="en-US" dirty="0"/>
-              <a:t>. </a:t>
-            </a:r>
-            <a:r>
-              <a:rPr lang="en-US" dirty="0" err="1"/>
-              <a:t>Praesent</a:t>
-            </a:r>
-            <a:r>
-              <a:rPr lang="en-US" dirty="0"/>
-              <a:t> </a:t>
-            </a:r>
-            <a:r>
-              <a:rPr lang="en-US" dirty="0" err="1"/>
-              <a:t>interdum</a:t>
-            </a:r>
-            <a:r>
-              <a:rPr lang="en-US" dirty="0"/>
-              <a:t> </a:t>
-            </a:r>
-            <a:r>
-              <a:rPr lang="en-US" dirty="0" err="1"/>
-              <a:t>est</a:t>
-            </a:r>
-            <a:r>
-              <a:rPr lang="en-US" dirty="0"/>
-              <a:t> </a:t>
-            </a:r>
-            <a:r>
-              <a:rPr lang="en-US" dirty="0" err="1"/>
-              <a:t>tincidunt</a:t>
-            </a:r>
-            <a:r>
-              <a:rPr lang="en-US" dirty="0"/>
-              <a:t> </a:t>
-            </a:r>
-            <a:r>
-              <a:rPr lang="en-US" dirty="0" err="1"/>
-              <a:t>consequat</a:t>
-            </a:r>
-            <a:r>
-              <a:rPr lang="en-US" dirty="0"/>
-              <a:t> gravida. Integer </a:t>
-            </a:r>
-            <a:r>
-              <a:rPr lang="en-US" dirty="0" err="1"/>
-              <a:t>quis</a:t>
-            </a:r>
-            <a:r>
-              <a:rPr lang="en-US" dirty="0"/>
-              <a:t> </a:t>
-            </a:r>
-            <a:r>
-              <a:rPr lang="en-US" dirty="0" err="1"/>
-              <a:t>turpis</a:t>
-            </a:r>
-            <a:r>
-              <a:rPr lang="en-US" dirty="0"/>
-              <a:t> </a:t>
-            </a:r>
-            <a:r>
-              <a:rPr lang="en-US" dirty="0" err="1"/>
-              <a:t>nisl</a:t>
-            </a:r>
-            <a:r>
-              <a:rPr lang="en-US" dirty="0"/>
-              <a:t>. Ut </a:t>
-            </a:r>
-            <a:r>
-              <a:rPr lang="en-US" dirty="0" err="1"/>
-              <a:t>efficitur</a:t>
-            </a:r>
-            <a:r>
-              <a:rPr lang="en-US" dirty="0"/>
-              <a:t> </a:t>
-            </a:r>
-            <a:r>
-              <a:rPr lang="en-US" dirty="0" err="1"/>
-              <a:t>felis</a:t>
-            </a:r>
-            <a:r>
-              <a:rPr lang="en-US" dirty="0"/>
-              <a:t> ac libero </a:t>
-            </a:r>
-            <a:r>
-              <a:rPr lang="en-US" dirty="0" err="1"/>
-              <a:t>molestie</a:t>
-            </a:r>
-            <a:r>
-              <a:rPr lang="en-US" dirty="0"/>
-              <a:t> pulvinar. Morbi </a:t>
-            </a:r>
-            <a:r>
-              <a:rPr lang="en-US" dirty="0" err="1"/>
-              <a:t>viverra</a:t>
-            </a:r>
-            <a:r>
-              <a:rPr lang="en-US" dirty="0"/>
-              <a:t> </a:t>
-            </a:r>
-            <a:r>
-              <a:rPr lang="en-US" dirty="0" err="1"/>
-              <a:t>neque</a:t>
-            </a:r>
-            <a:r>
-              <a:rPr lang="en-US" dirty="0"/>
-              <a:t> </a:t>
-            </a:r>
-            <a:r>
-              <a:rPr lang="en-US" dirty="0" err="1"/>
-              <a:t>mattis</a:t>
-            </a:r>
-            <a:r>
-              <a:rPr lang="en-US" dirty="0"/>
-              <a:t>, </a:t>
-            </a:r>
-            <a:r>
-              <a:rPr lang="en-US" dirty="0" err="1"/>
-              <a:t>posuere</a:t>
-            </a:r>
-            <a:r>
-              <a:rPr lang="en-US" dirty="0"/>
-              <a:t> </a:t>
-            </a:r>
-            <a:r>
-              <a:rPr lang="en-US" dirty="0" err="1"/>
-              <a:t>tellus</a:t>
-            </a:r>
-            <a:r>
-              <a:rPr lang="en-US" dirty="0"/>
-              <a:t> </a:t>
-            </a:r>
-            <a:r>
-              <a:rPr lang="en-US" dirty="0" err="1"/>
-              <a:t>quis</a:t>
-            </a:r>
-            <a:r>
-              <a:rPr lang="en-US" dirty="0"/>
-              <a:t>, cursus </a:t>
-            </a:r>
-            <a:r>
-              <a:rPr lang="en-US" dirty="0" err="1"/>
-              <a:t>felis</a:t>
-            </a:r>
-            <a:r>
-              <a:rPr lang="en-US" dirty="0"/>
-              <a:t>. Nam </a:t>
-            </a:r>
-            <a:r>
-              <a:rPr lang="en-US" dirty="0" err="1"/>
-              <a:t>venenatis</a:t>
-            </a:r>
-            <a:r>
-              <a:rPr lang="en-US" dirty="0"/>
-              <a:t> gravida </a:t>
-            </a:r>
-            <a:r>
-              <a:rPr lang="en-US" dirty="0" err="1"/>
-              <a:t>orci</a:t>
-            </a:r>
-            <a:r>
-              <a:rPr lang="en-US" dirty="0"/>
-              <a:t> </a:t>
-            </a:r>
-            <a:r>
-              <a:rPr lang="en-US" dirty="0" err="1"/>
-              <a:t>imperdiet</a:t>
-            </a:r>
-            <a:r>
-              <a:rPr lang="en-US" dirty="0"/>
-              <a:t> </a:t>
-            </a:r>
-            <a:r>
-              <a:rPr lang="en-US" dirty="0" err="1"/>
-              <a:t>malesuada</a:t>
-            </a:r>
-            <a:r>
-              <a:rPr lang="en-US" dirty="0"/>
-              <a:t>. Morbi </a:t>
-            </a:r>
-            <a:r>
-              <a:rPr lang="en-US" dirty="0" err="1"/>
-              <a:t>dapibus</a:t>
-            </a:r>
-            <a:r>
-              <a:rPr lang="en-US" dirty="0"/>
-              <a:t> magna vitae </a:t>
-            </a:r>
-            <a:r>
-              <a:rPr lang="en-US" dirty="0" err="1"/>
-              <a:t>accumsan</a:t>
-            </a:r>
-            <a:r>
-              <a:rPr lang="en-US" dirty="0"/>
-              <a:t> </a:t>
-            </a:r>
-            <a:r>
-              <a:rPr lang="en-US" dirty="0" err="1"/>
-              <a:t>sodales</a:t>
-            </a:r>
-            <a:r>
-              <a:rPr lang="en-US" dirty="0"/>
-              <a:t>. </a:t>
-            </a:r>
-            <a:r>
-              <a:rPr lang="en-US" dirty="0" err="1"/>
-              <a:t>Aenean</a:t>
-            </a:r>
-            <a:r>
-              <a:rPr lang="en-US" dirty="0"/>
-              <a:t> et </a:t>
-            </a:r>
-            <a:r>
-              <a:rPr lang="en-US" dirty="0" err="1"/>
-              <a:t>volutpat</a:t>
-            </a:r>
-            <a:r>
-              <a:rPr lang="en-US" dirty="0"/>
-              <a:t> </a:t>
-            </a:r>
-            <a:r>
-              <a:rPr lang="en-US" dirty="0" err="1"/>
-              <a:t>tellus</a:t>
-            </a:r>
-            <a:r>
-              <a:rPr lang="en-US" dirty="0"/>
-              <a:t>.</a:t>
-            </a:r>
+            <a:pPr algn="ctr"/>
+            <a:endParaRPr lang="en-US"/>
           </a:p>
         </p:txBody>
       </p:sp>
@@ -27277,10 +28748,9 @@
           </a:lstStyle>
           <a:p>
             <a:r>
-              <a:rPr lang="en-US"/>
+              <a:rPr lang="en-US" dirty="0"/>
               <a:t>APPNAME</a:t>
             </a:r>
-            <a:endParaRPr lang="en-US" dirty="0"/>
           </a:p>
         </p:txBody>
       </p:sp>
@@ -27314,192 +28784,12 @@
           </a:prstGeom>
         </p:spPr>
       </p:pic>
-      <p:pic>
-        <p:nvPicPr>
-          <p:cNvPr id="46" name="Picture 45">
-            <a:extLst>
-              <a:ext uri="{FF2B5EF4-FFF2-40B4-BE49-F238E27FC236}">
-                <a16:creationId xmlns:a16="http://schemas.microsoft.com/office/drawing/2014/main" id="{D54851C7-D55B-40D7-AD61-E9B6A0754950}"/>
-              </a:ext>
-            </a:extLst>
-          </p:cNvPr>
-          <p:cNvPicPr>
-            <a:picLocks noChangeAspect="1"/>
-          </p:cNvPicPr>
-          <p:nvPr/>
-        </p:nvPicPr>
-        <p:blipFill>
-          <a:blip r:embed="rId3"/>
-          <a:stretch>
-            <a:fillRect/>
-          </a:stretch>
-        </p:blipFill>
-        <p:spPr>
-          <a:xfrm>
-            <a:off x="125022" y="1160982"/>
-            <a:ext cx="517061" cy="343948"/>
-          </a:xfrm>
-          <a:prstGeom prst="rect">
-            <a:avLst/>
-          </a:prstGeom>
-        </p:spPr>
-      </p:pic>
-      <p:pic>
-        <p:nvPicPr>
-          <p:cNvPr id="47" name="Picture 46">
-            <a:extLst>
-              <a:ext uri="{FF2B5EF4-FFF2-40B4-BE49-F238E27FC236}">
-                <a16:creationId xmlns:a16="http://schemas.microsoft.com/office/drawing/2014/main" id="{11FB03DB-6C31-4172-9EE3-FED596CB2D4D}"/>
-              </a:ext>
-            </a:extLst>
-          </p:cNvPr>
-          <p:cNvPicPr>
-            <a:picLocks noChangeAspect="1"/>
-          </p:cNvPicPr>
-          <p:nvPr/>
-        </p:nvPicPr>
-        <p:blipFill>
-          <a:blip r:embed="rId4"/>
-          <a:stretch>
-            <a:fillRect/>
-          </a:stretch>
-        </p:blipFill>
-        <p:spPr>
-          <a:xfrm>
-            <a:off x="1861543" y="1160982"/>
-            <a:ext cx="517061" cy="343948"/>
-          </a:xfrm>
-          <a:prstGeom prst="rect">
-            <a:avLst/>
-          </a:prstGeom>
-        </p:spPr>
-      </p:pic>
-      <p:pic>
-        <p:nvPicPr>
-          <p:cNvPr id="48" name="Picture 47">
-            <a:extLst>
-              <a:ext uri="{FF2B5EF4-FFF2-40B4-BE49-F238E27FC236}">
-                <a16:creationId xmlns:a16="http://schemas.microsoft.com/office/drawing/2014/main" id="{1F663FBE-FA88-40E1-84E1-3EFC98632790}"/>
-              </a:ext>
-            </a:extLst>
-          </p:cNvPr>
-          <p:cNvPicPr>
-            <a:picLocks noChangeAspect="1"/>
-          </p:cNvPicPr>
-          <p:nvPr/>
-        </p:nvPicPr>
-        <p:blipFill>
-          <a:blip r:embed="rId5"/>
-          <a:stretch>
-            <a:fillRect/>
-          </a:stretch>
-        </p:blipFill>
-        <p:spPr>
-          <a:xfrm>
-            <a:off x="3598064" y="1160982"/>
-            <a:ext cx="517061" cy="343948"/>
-          </a:xfrm>
-          <a:prstGeom prst="rect">
-            <a:avLst/>
-          </a:prstGeom>
-        </p:spPr>
-      </p:pic>
-      <p:pic>
-        <p:nvPicPr>
-          <p:cNvPr id="49" name="Picture 48">
-            <a:extLst>
-              <a:ext uri="{FF2B5EF4-FFF2-40B4-BE49-F238E27FC236}">
-                <a16:creationId xmlns:a16="http://schemas.microsoft.com/office/drawing/2014/main" id="{76A0A855-B58B-4C82-A7CA-8EF86E0009F3}"/>
-              </a:ext>
-            </a:extLst>
-          </p:cNvPr>
-          <p:cNvPicPr>
-            <a:picLocks noChangeAspect="1"/>
-          </p:cNvPicPr>
-          <p:nvPr/>
-        </p:nvPicPr>
-        <p:blipFill>
-          <a:blip r:embed="rId6"/>
-          <a:stretch>
-            <a:fillRect/>
-          </a:stretch>
-        </p:blipFill>
-        <p:spPr>
-          <a:xfrm>
-            <a:off x="5342974" y="1160982"/>
-            <a:ext cx="517061" cy="343948"/>
-          </a:xfrm>
-          <a:prstGeom prst="rect">
-            <a:avLst/>
-          </a:prstGeom>
-        </p:spPr>
-      </p:pic>
-      <p:pic>
-        <p:nvPicPr>
-          <p:cNvPr id="50" name="Picture 49">
-            <a:extLst>
-              <a:ext uri="{FF2B5EF4-FFF2-40B4-BE49-F238E27FC236}">
-                <a16:creationId xmlns:a16="http://schemas.microsoft.com/office/drawing/2014/main" id="{68D592BE-9656-4F18-A9DB-F63A9C2AE09D}"/>
-              </a:ext>
-            </a:extLst>
-          </p:cNvPr>
-          <p:cNvPicPr>
-            <a:picLocks noChangeAspect="1"/>
-          </p:cNvPicPr>
-          <p:nvPr/>
-        </p:nvPicPr>
-        <p:blipFill>
-          <a:blip r:embed="rId7"/>
-          <a:stretch>
-            <a:fillRect/>
-          </a:stretch>
-        </p:blipFill>
-        <p:spPr>
-          <a:xfrm>
-            <a:off x="7087884" y="1160982"/>
-            <a:ext cx="571561" cy="343948"/>
-          </a:xfrm>
-          <a:prstGeom prst="rect">
-            <a:avLst/>
-          </a:prstGeom>
-        </p:spPr>
-      </p:pic>
-      <p:pic>
-        <p:nvPicPr>
-          <p:cNvPr id="51" name="Picture 50">
-            <a:extLst>
-              <a:ext uri="{FF2B5EF4-FFF2-40B4-BE49-F238E27FC236}">
-                <a16:creationId xmlns:a16="http://schemas.microsoft.com/office/drawing/2014/main" id="{6C8DE1FD-7253-44DE-AD59-EA0347304E35}"/>
-              </a:ext>
-            </a:extLst>
-          </p:cNvPr>
-          <p:cNvPicPr>
-            <a:picLocks noChangeAspect="1"/>
-          </p:cNvPicPr>
-          <p:nvPr/>
-        </p:nvPicPr>
-        <p:blipFill>
-          <a:blip r:embed="rId8"/>
-          <a:stretch>
-            <a:fillRect/>
-          </a:stretch>
-        </p:blipFill>
-        <p:spPr>
-          <a:xfrm>
-            <a:off x="8878905" y="1160982"/>
-            <a:ext cx="517061" cy="343948"/>
-          </a:xfrm>
-          <a:prstGeom prst="rect">
-            <a:avLst/>
-          </a:prstGeom>
-        </p:spPr>
-      </p:pic>
       <p:sp>
         <p:nvSpPr>
-          <p:cNvPr id="52" name="TextBox 51">
-            <a:extLst>
-              <a:ext uri="{FF2B5EF4-FFF2-40B4-BE49-F238E27FC236}">
-                <a16:creationId xmlns:a16="http://schemas.microsoft.com/office/drawing/2014/main" id="{EC95C66F-5BC8-490C-B27C-7EF276C73008}"/>
+          <p:cNvPr id="43" name="TextBox 42">
+            <a:extLst>
+              <a:ext uri="{FF2B5EF4-FFF2-40B4-BE49-F238E27FC236}">
+                <a16:creationId xmlns:a16="http://schemas.microsoft.com/office/drawing/2014/main" id="{100BF56B-3B8F-4DDB-94CB-116F2363D568}"/>
               </a:ext>
             </a:extLst>
           </p:cNvPr>
@@ -27508,20 +28798,13 @@
         </p:nvSpPr>
         <p:spPr>
           <a:xfrm>
-            <a:off x="8619305" y="336694"/>
-            <a:ext cx="1996121" cy="369332"/>
+            <a:off x="166876" y="237078"/>
+            <a:ext cx="1451552" cy="369335"/>
           </a:xfrm>
           <a:prstGeom prst="rect">
             <a:avLst/>
           </a:prstGeom>
           <a:noFill/>
-          <a:ln>
-            <a:solidFill>
-              <a:schemeClr val="bg1">
-                <a:lumMod val="65000"/>
-              </a:schemeClr>
-            </a:solidFill>
-          </a:ln>
         </p:spPr>
         <p:txBody>
           <a:bodyPr wrap="square" rtlCol="0">
@@ -27531,17 +28814,93 @@
           <a:p>
             <a:r>
               <a:rPr lang="en-US" dirty="0"/>
-              <a:t>Word of the Day</a:t>
+              <a:t>Apr 17, 2018</a:t>
             </a:r>
           </a:p>
         </p:txBody>
       </p:sp>
       <p:sp>
         <p:nvSpPr>
-          <p:cNvPr id="53" name="Isosceles Triangle 52">
-            <a:extLst>
-              <a:ext uri="{FF2B5EF4-FFF2-40B4-BE49-F238E27FC236}">
-                <a16:creationId xmlns:a16="http://schemas.microsoft.com/office/drawing/2014/main" id="{890068DB-CD3C-4A72-B49B-BBA99066A336}"/>
+          <p:cNvPr id="2" name="TextBox 1">
+            <a:extLst>
+              <a:ext uri="{FF2B5EF4-FFF2-40B4-BE49-F238E27FC236}">
+                <a16:creationId xmlns:a16="http://schemas.microsoft.com/office/drawing/2014/main" id="{F2234242-13A1-46EC-949B-9D3F9940C316}"/>
+              </a:ext>
+            </a:extLst>
+          </p:cNvPr>
+          <p:cNvSpPr txBox="1"/>
+          <p:nvPr/>
+        </p:nvSpPr>
+        <p:spPr>
+          <a:xfrm>
+            <a:off x="3624205" y="1693595"/>
+            <a:ext cx="4471656" cy="769441"/>
+          </a:xfrm>
+          <a:prstGeom prst="rect">
+            <a:avLst/>
+          </a:prstGeom>
+          <a:noFill/>
+        </p:spPr>
+        <p:txBody>
+          <a:bodyPr wrap="square" rtlCol="0">
+            <a:spAutoFit/>
+          </a:bodyPr>
+          <a:lstStyle/>
+          <a:p>
+            <a:pPr algn="ctr"/>
+            <a:r>
+              <a:rPr lang="en-US" sz="4400" dirty="0"/>
+              <a:t>Retrieve Password</a:t>
+            </a:r>
+          </a:p>
+        </p:txBody>
+      </p:sp>
+      <p:sp>
+        <p:nvSpPr>
+          <p:cNvPr id="3" name="TextBox 2">
+            <a:extLst>
+              <a:ext uri="{FF2B5EF4-FFF2-40B4-BE49-F238E27FC236}">
+                <a16:creationId xmlns:a16="http://schemas.microsoft.com/office/drawing/2014/main" id="{C262CDD3-37C7-4C7E-A80A-1086613796D8}"/>
+              </a:ext>
+            </a:extLst>
+          </p:cNvPr>
+          <p:cNvSpPr txBox="1"/>
+          <p:nvPr/>
+        </p:nvSpPr>
+        <p:spPr>
+          <a:xfrm>
+            <a:off x="3901044" y="2810497"/>
+            <a:ext cx="1569978" cy="589072"/>
+          </a:xfrm>
+          <a:prstGeom prst="rect">
+            <a:avLst/>
+          </a:prstGeom>
+          <a:noFill/>
+        </p:spPr>
+        <p:txBody>
+          <a:bodyPr wrap="square" rtlCol="0">
+            <a:spAutoFit/>
+          </a:bodyPr>
+          <a:lstStyle/>
+          <a:p>
+            <a:pPr algn="r">
+              <a:lnSpc>
+                <a:spcPct val="150000"/>
+              </a:lnSpc>
+            </a:pPr>
+            <a:r>
+              <a:rPr lang="en-US" sz="2400" dirty="0"/>
+              <a:t>Email:</a:t>
+            </a:r>
+          </a:p>
+        </p:txBody>
+      </p:sp>
+      <p:sp>
+        <p:nvSpPr>
+          <p:cNvPr id="26" name="Rectangle 25">
+            <a:extLst>
+              <a:ext uri="{FF2B5EF4-FFF2-40B4-BE49-F238E27FC236}">
+                <a16:creationId xmlns:a16="http://schemas.microsoft.com/office/drawing/2014/main" id="{9333CEE5-6A1E-48A6-B129-2D43BB19242C}"/>
               </a:ext>
             </a:extLst>
           </p:cNvPr>
@@ -27549,15 +28908,15 @@
           <p:nvPr/>
         </p:nvSpPr>
         <p:spPr>
-          <a:xfrm rot="10800000">
-            <a:off x="10387651" y="480024"/>
-            <a:ext cx="118215" cy="101910"/>
+          <a:xfrm>
+            <a:off x="5471022" y="3025575"/>
+            <a:ext cx="1945171" cy="317318"/>
           </a:xfrm>
-          <a:prstGeom prst="triangle">
+          <a:prstGeom prst="rect">
             <a:avLst/>
           </a:prstGeom>
           <a:solidFill>
-            <a:schemeClr val="tx1"/>
+            <a:schemeClr val="bg1"/>
           </a:solidFill>
           <a:ln>
             <a:solidFill>
@@ -27590,12 +28949,53 @@
           </a:p>
         </p:txBody>
       </p:sp>
+      <p:sp>
+        <p:nvSpPr>
+          <p:cNvPr id="29" name="TextBox 28">
+            <a:extLst>
+              <a:ext uri="{FF2B5EF4-FFF2-40B4-BE49-F238E27FC236}">
+                <a16:creationId xmlns:a16="http://schemas.microsoft.com/office/drawing/2014/main" id="{E6868E88-CF2B-4CCA-8540-7ADA2EAA6B4D}"/>
+              </a:ext>
+            </a:extLst>
+          </p:cNvPr>
+          <p:cNvSpPr txBox="1"/>
+          <p:nvPr/>
+        </p:nvSpPr>
+        <p:spPr>
+          <a:xfrm>
+            <a:off x="4513600" y="3961419"/>
+            <a:ext cx="2692866" cy="461665"/>
+          </a:xfrm>
+          <a:prstGeom prst="rect">
+            <a:avLst/>
+          </a:prstGeom>
+          <a:solidFill>
+            <a:schemeClr val="accent4">
+              <a:lumMod val="20000"/>
+              <a:lumOff val="80000"/>
+            </a:schemeClr>
+          </a:solidFill>
+        </p:spPr>
+        <p:txBody>
+          <a:bodyPr wrap="square" rtlCol="0">
+            <a:spAutoFit/>
+          </a:bodyPr>
+          <a:lstStyle/>
+          <a:p>
+            <a:pPr algn="ctr"/>
+            <a:r>
+              <a:rPr lang="en-US" sz="2400" dirty="0"/>
+              <a:t>Find My Password!</a:t>
+            </a:r>
+          </a:p>
+        </p:txBody>
+      </p:sp>
       <p:pic>
         <p:nvPicPr>
-          <p:cNvPr id="54" name="Picture 53">
-            <a:extLst>
-              <a:ext uri="{FF2B5EF4-FFF2-40B4-BE49-F238E27FC236}">
-                <a16:creationId xmlns:a16="http://schemas.microsoft.com/office/drawing/2014/main" id="{561ED4C5-3732-484D-9574-BAB6EBC8C01C}"/>
+          <p:cNvPr id="32" name="Graphic 31" descr="Home">
+            <a:extLst>
+              <a:ext uri="{FF2B5EF4-FFF2-40B4-BE49-F238E27FC236}">
+                <a16:creationId xmlns:a16="http://schemas.microsoft.com/office/drawing/2014/main" id="{E36EBDE5-EFA7-47B8-B16D-6905674E5B38}"/>
               </a:ext>
             </a:extLst>
           </p:cNvPr>
@@ -27605,973 +29005,34 @@
           <p:nvPr/>
         </p:nvPicPr>
         <p:blipFill>
-          <a:blip r:embed="rId9"/>
+          <a:blip r:embed="rId3">
+            <a:extLst>
+              <a:ext uri="{28A0092B-C50C-407E-A947-70E740481C1C}">
+                <a14:useLocalDpi xmlns:a14="http://schemas.microsoft.com/office/drawing/2010/main" val="0"/>
+              </a:ext>
+              <a:ext uri="{96DAC541-7B7A-43D3-8B79-37D633B846F1}">
+                <asvg:svgBlip xmlns:asvg="http://schemas.microsoft.com/office/drawing/2016/SVG/main" r:embed="rId4"/>
+              </a:ext>
+            </a:extLst>
+          </a:blip>
           <a:stretch>
             <a:fillRect/>
           </a:stretch>
         </p:blipFill>
         <p:spPr>
           <a:xfrm>
-            <a:off x="10615426" y="1160805"/>
-            <a:ext cx="517061" cy="343948"/>
+            <a:off x="10695396" y="237078"/>
+            <a:ext cx="555460" cy="555460"/>
           </a:xfrm>
           <a:prstGeom prst="rect">
             <a:avLst/>
           </a:prstGeom>
         </p:spPr>
       </p:pic>
-      <p:graphicFrame>
-        <p:nvGraphicFramePr>
-          <p:cNvPr id="55" name="Table 54">
-            <a:extLst>
-              <a:ext uri="{FF2B5EF4-FFF2-40B4-BE49-F238E27FC236}">
-                <a16:creationId xmlns:a16="http://schemas.microsoft.com/office/drawing/2014/main" id="{92480899-10DA-4AF7-B68C-77E7FE787A5D}"/>
-              </a:ext>
-            </a:extLst>
-          </p:cNvPr>
-          <p:cNvGraphicFramePr>
-            <a:graphicFrameLocks noGrp="1"/>
-          </p:cNvGraphicFramePr>
-          <p:nvPr/>
-        </p:nvGraphicFramePr>
-        <p:xfrm>
-          <a:off x="10922239" y="336691"/>
-          <a:ext cx="420495" cy="401820"/>
-        </p:xfrm>
-        <a:graphic>
-          <a:graphicData uri="http://schemas.openxmlformats.org/drawingml/2006/table">
-            <a:tbl>
-              <a:tblPr firstRow="1" bandRow="1">
-                <a:tableStyleId>{5C22544A-7EE6-4342-B048-85BDC9FD1C3A}</a:tableStyleId>
-              </a:tblPr>
-              <a:tblGrid>
-                <a:gridCol w="59067">
-                  <a:extLst>
-                    <a:ext uri="{9D8B030D-6E8A-4147-A177-3AD203B41FA5}">
-                      <a16:colId xmlns:a16="http://schemas.microsoft.com/office/drawing/2014/main" val="3545709835"/>
-                    </a:ext>
-                  </a:extLst>
-                </a:gridCol>
-                <a:gridCol w="59067">
-                  <a:extLst>
-                    <a:ext uri="{9D8B030D-6E8A-4147-A177-3AD203B41FA5}">
-                      <a16:colId xmlns:a16="http://schemas.microsoft.com/office/drawing/2014/main" val="1536539272"/>
-                    </a:ext>
-                  </a:extLst>
-                </a:gridCol>
-                <a:gridCol w="59067">
-                  <a:extLst>
-                    <a:ext uri="{9D8B030D-6E8A-4147-A177-3AD203B41FA5}">
-                      <a16:colId xmlns:a16="http://schemas.microsoft.com/office/drawing/2014/main" val="724148412"/>
-                    </a:ext>
-                  </a:extLst>
-                </a:gridCol>
-                <a:gridCol w="66734">
-                  <a:extLst>
-                    <a:ext uri="{9D8B030D-6E8A-4147-A177-3AD203B41FA5}">
-                      <a16:colId xmlns:a16="http://schemas.microsoft.com/office/drawing/2014/main" val="3972265715"/>
-                    </a:ext>
-                  </a:extLst>
-                </a:gridCol>
-                <a:gridCol w="58426">
-                  <a:extLst>
-                    <a:ext uri="{9D8B030D-6E8A-4147-A177-3AD203B41FA5}">
-                      <a16:colId xmlns:a16="http://schemas.microsoft.com/office/drawing/2014/main" val="235822871"/>
-                    </a:ext>
-                  </a:extLst>
-                </a:gridCol>
-                <a:gridCol w="59067">
-                  <a:extLst>
-                    <a:ext uri="{9D8B030D-6E8A-4147-A177-3AD203B41FA5}">
-                      <a16:colId xmlns:a16="http://schemas.microsoft.com/office/drawing/2014/main" val="3787159753"/>
-                    </a:ext>
-                  </a:extLst>
-                </a:gridCol>
-                <a:gridCol w="59067">
-                  <a:extLst>
-                    <a:ext uri="{9D8B030D-6E8A-4147-A177-3AD203B41FA5}">
-                      <a16:colId xmlns:a16="http://schemas.microsoft.com/office/drawing/2014/main" val="619306071"/>
-                    </a:ext>
-                  </a:extLst>
-                </a:gridCol>
-              </a:tblGrid>
-              <a:tr h="66970">
-                <a:tc>
-                  <a:txBody>
-                    <a:bodyPr/>
-                    <a:lstStyle/>
-                    <a:p>
-                      <a:endParaRPr lang="en-US" sz="300" dirty="0"/>
-                    </a:p>
-                  </a:txBody>
-                  <a:tcPr marL="16513" marR="16513" marT="8257" marB="8257">
-                    <a:lnL w="12700" cap="flat" cmpd="sng" algn="ctr">
-                      <a:solidFill>
-                        <a:schemeClr val="accent1"/>
-                      </a:solidFill>
-                      <a:prstDash val="solid"/>
-                      <a:round/>
-                      <a:headEnd type="none" w="med" len="med"/>
-                      <a:tailEnd type="none" w="med" len="med"/>
-                    </a:lnL>
-                    <a:lnT w="12700" cap="flat" cmpd="sng" algn="ctr">
-                      <a:solidFill>
-                        <a:schemeClr val="accent1"/>
-                      </a:solidFill>
-                      <a:prstDash val="solid"/>
-                      <a:round/>
-                      <a:headEnd type="none" w="med" len="med"/>
-                      <a:tailEnd type="none" w="med" len="med"/>
-                    </a:lnT>
-                  </a:tcPr>
-                </a:tc>
-                <a:tc>
-                  <a:txBody>
-                    <a:bodyPr/>
-                    <a:lstStyle/>
-                    <a:p>
-                      <a:endParaRPr lang="en-US" sz="300"/>
-                    </a:p>
-                  </a:txBody>
-                  <a:tcPr marL="16513" marR="16513" marT="8257" marB="8257">
-                    <a:lnT w="12700" cap="flat" cmpd="sng" algn="ctr">
-                      <a:solidFill>
-                        <a:schemeClr val="accent1"/>
-                      </a:solidFill>
-                      <a:prstDash val="solid"/>
-                      <a:round/>
-                      <a:headEnd type="none" w="med" len="med"/>
-                      <a:tailEnd type="none" w="med" len="med"/>
-                    </a:lnT>
-                  </a:tcPr>
-                </a:tc>
-                <a:tc>
-                  <a:txBody>
-                    <a:bodyPr/>
-                    <a:lstStyle/>
-                    <a:p>
-                      <a:endParaRPr lang="en-US" sz="300"/>
-                    </a:p>
-                  </a:txBody>
-                  <a:tcPr marL="16513" marR="16513" marT="8257" marB="8257">
-                    <a:lnT w="12700" cap="flat" cmpd="sng" algn="ctr">
-                      <a:solidFill>
-                        <a:schemeClr val="accent1"/>
-                      </a:solidFill>
-                      <a:prstDash val="solid"/>
-                      <a:round/>
-                      <a:headEnd type="none" w="med" len="med"/>
-                      <a:tailEnd type="none" w="med" len="med"/>
-                    </a:lnT>
-                  </a:tcPr>
-                </a:tc>
-                <a:tc>
-                  <a:txBody>
-                    <a:bodyPr/>
-                    <a:lstStyle/>
-                    <a:p>
-                      <a:endParaRPr lang="en-US" sz="300"/>
-                    </a:p>
-                  </a:txBody>
-                  <a:tcPr marL="16513" marR="16513" marT="8257" marB="8257">
-                    <a:lnT w="12700" cap="flat" cmpd="sng" algn="ctr">
-                      <a:solidFill>
-                        <a:schemeClr val="accent1"/>
-                      </a:solidFill>
-                      <a:prstDash val="solid"/>
-                      <a:round/>
-                      <a:headEnd type="none" w="med" len="med"/>
-                      <a:tailEnd type="none" w="med" len="med"/>
-                    </a:lnT>
-                  </a:tcPr>
-                </a:tc>
-                <a:tc>
-                  <a:txBody>
-                    <a:bodyPr/>
-                    <a:lstStyle/>
-                    <a:p>
-                      <a:endParaRPr lang="en-US" sz="300"/>
-                    </a:p>
-                  </a:txBody>
-                  <a:tcPr marL="16513" marR="16513" marT="8257" marB="8257">
-                    <a:lnT w="12700" cap="flat" cmpd="sng" algn="ctr">
-                      <a:solidFill>
-                        <a:schemeClr val="accent1"/>
-                      </a:solidFill>
-                      <a:prstDash val="solid"/>
-                      <a:round/>
-                      <a:headEnd type="none" w="med" len="med"/>
-                      <a:tailEnd type="none" w="med" len="med"/>
-                    </a:lnT>
-                  </a:tcPr>
-                </a:tc>
-                <a:tc>
-                  <a:txBody>
-                    <a:bodyPr/>
-                    <a:lstStyle/>
-                    <a:p>
-                      <a:endParaRPr lang="en-US" sz="300"/>
-                    </a:p>
-                  </a:txBody>
-                  <a:tcPr marL="16513" marR="16513" marT="8257" marB="8257">
-                    <a:lnT w="12700" cap="flat" cmpd="sng" algn="ctr">
-                      <a:solidFill>
-                        <a:schemeClr val="accent1"/>
-                      </a:solidFill>
-                      <a:prstDash val="solid"/>
-                      <a:round/>
-                      <a:headEnd type="none" w="med" len="med"/>
-                      <a:tailEnd type="none" w="med" len="med"/>
-                    </a:lnT>
-                  </a:tcPr>
-                </a:tc>
-                <a:tc>
-                  <a:txBody>
-                    <a:bodyPr/>
-                    <a:lstStyle/>
-                    <a:p>
-                      <a:endParaRPr lang="en-US" sz="300"/>
-                    </a:p>
-                  </a:txBody>
-                  <a:tcPr marL="16513" marR="16513" marT="8257" marB="8257">
-                    <a:lnR w="12700" cap="flat" cmpd="sng" algn="ctr">
-                      <a:solidFill>
-                        <a:schemeClr val="accent1"/>
-                      </a:solidFill>
-                      <a:prstDash val="solid"/>
-                      <a:round/>
-                      <a:headEnd type="none" w="med" len="med"/>
-                      <a:tailEnd type="none" w="med" len="med"/>
-                    </a:lnR>
-                    <a:lnT w="12700" cap="flat" cmpd="sng" algn="ctr">
-                      <a:solidFill>
-                        <a:schemeClr val="accent1"/>
-                      </a:solidFill>
-                      <a:prstDash val="solid"/>
-                      <a:round/>
-                      <a:headEnd type="none" w="med" len="med"/>
-                      <a:tailEnd type="none" w="med" len="med"/>
-                    </a:lnT>
-                  </a:tcPr>
-                </a:tc>
-                <a:extLst>
-                  <a:ext uri="{0D108BD9-81ED-4DB2-BD59-A6C34878D82A}">
-                    <a16:rowId xmlns:a16="http://schemas.microsoft.com/office/drawing/2014/main" val="897312188"/>
-                  </a:ext>
-                </a:extLst>
-              </a:tr>
-              <a:tr h="66970">
-                <a:tc>
-                  <a:txBody>
-                    <a:bodyPr/>
-                    <a:lstStyle/>
-                    <a:p>
-                      <a:endParaRPr lang="en-US" sz="300"/>
-                    </a:p>
-                  </a:txBody>
-                  <a:tcPr marL="16513" marR="16513" marT="8257" marB="8257">
-                    <a:lnL w="12700" cap="flat" cmpd="sng" algn="ctr">
-                      <a:solidFill>
-                        <a:schemeClr val="accent1"/>
-                      </a:solidFill>
-                      <a:prstDash val="solid"/>
-                      <a:round/>
-                      <a:headEnd type="none" w="med" len="med"/>
-                      <a:tailEnd type="none" w="med" len="med"/>
-                    </a:lnL>
-                  </a:tcPr>
-                </a:tc>
-                <a:tc>
-                  <a:txBody>
-                    <a:bodyPr/>
-                    <a:lstStyle/>
-                    <a:p>
-                      <a:endParaRPr lang="en-US" sz="300"/>
-                    </a:p>
-                  </a:txBody>
-                  <a:tcPr marL="16513" marR="16513" marT="8257" marB="8257"/>
-                </a:tc>
-                <a:tc>
-                  <a:txBody>
-                    <a:bodyPr/>
-                    <a:lstStyle/>
-                    <a:p>
-                      <a:endParaRPr lang="en-US" sz="300"/>
-                    </a:p>
-                  </a:txBody>
-                  <a:tcPr marL="16513" marR="16513" marT="8257" marB="8257"/>
-                </a:tc>
-                <a:tc>
-                  <a:txBody>
-                    <a:bodyPr/>
-                    <a:lstStyle/>
-                    <a:p>
-                      <a:endParaRPr lang="en-US" sz="300"/>
-                    </a:p>
-                  </a:txBody>
-                  <a:tcPr marL="16513" marR="16513" marT="8257" marB="8257"/>
-                </a:tc>
-                <a:tc>
-                  <a:txBody>
-                    <a:bodyPr/>
-                    <a:lstStyle/>
-                    <a:p>
-                      <a:endParaRPr lang="en-US" sz="300"/>
-                    </a:p>
-                  </a:txBody>
-                  <a:tcPr marL="16513" marR="16513" marT="8257" marB="8257"/>
-                </a:tc>
-                <a:tc>
-                  <a:txBody>
-                    <a:bodyPr/>
-                    <a:lstStyle/>
-                    <a:p>
-                      <a:endParaRPr lang="en-US" sz="300"/>
-                    </a:p>
-                  </a:txBody>
-                  <a:tcPr marL="16513" marR="16513" marT="8257" marB="8257"/>
-                </a:tc>
-                <a:tc>
-                  <a:txBody>
-                    <a:bodyPr/>
-                    <a:lstStyle/>
-                    <a:p>
-                      <a:endParaRPr lang="en-US" sz="300"/>
-                    </a:p>
-                  </a:txBody>
-                  <a:tcPr marL="16513" marR="16513" marT="8257" marB="8257">
-                    <a:lnR w="12700" cap="flat" cmpd="sng" algn="ctr">
-                      <a:solidFill>
-                        <a:schemeClr val="accent1"/>
-                      </a:solidFill>
-                      <a:prstDash val="solid"/>
-                      <a:round/>
-                      <a:headEnd type="none" w="med" len="med"/>
-                      <a:tailEnd type="none" w="med" len="med"/>
-                    </a:lnR>
-                  </a:tcPr>
-                </a:tc>
-                <a:extLst>
-                  <a:ext uri="{0D108BD9-81ED-4DB2-BD59-A6C34878D82A}">
-                    <a16:rowId xmlns:a16="http://schemas.microsoft.com/office/drawing/2014/main" val="596896816"/>
-                  </a:ext>
-                </a:extLst>
-              </a:tr>
-              <a:tr h="66970">
-                <a:tc>
-                  <a:txBody>
-                    <a:bodyPr/>
-                    <a:lstStyle/>
-                    <a:p>
-                      <a:endParaRPr lang="en-US" sz="300"/>
-                    </a:p>
-                  </a:txBody>
-                  <a:tcPr marL="16513" marR="16513" marT="8257" marB="8257">
-                    <a:lnL w="12700" cap="flat" cmpd="sng" algn="ctr">
-                      <a:solidFill>
-                        <a:schemeClr val="accent1"/>
-                      </a:solidFill>
-                      <a:prstDash val="solid"/>
-                      <a:round/>
-                      <a:headEnd type="none" w="med" len="med"/>
-                      <a:tailEnd type="none" w="med" len="med"/>
-                    </a:lnL>
-                  </a:tcPr>
-                </a:tc>
-                <a:tc>
-                  <a:txBody>
-                    <a:bodyPr/>
-                    <a:lstStyle/>
-                    <a:p>
-                      <a:endParaRPr lang="en-US" sz="300"/>
-                    </a:p>
-                  </a:txBody>
-                  <a:tcPr marL="16513" marR="16513" marT="8257" marB="8257"/>
-                </a:tc>
-                <a:tc>
-                  <a:txBody>
-                    <a:bodyPr/>
-                    <a:lstStyle/>
-                    <a:p>
-                      <a:endParaRPr lang="en-US" sz="300"/>
-                    </a:p>
-                  </a:txBody>
-                  <a:tcPr marL="16513" marR="16513" marT="8257" marB="8257"/>
-                </a:tc>
-                <a:tc>
-                  <a:txBody>
-                    <a:bodyPr/>
-                    <a:lstStyle/>
-                    <a:p>
-                      <a:endParaRPr lang="en-US" sz="300"/>
-                    </a:p>
-                  </a:txBody>
-                  <a:tcPr marL="16513" marR="16513" marT="8257" marB="8257"/>
-                </a:tc>
-                <a:tc>
-                  <a:txBody>
-                    <a:bodyPr/>
-                    <a:lstStyle/>
-                    <a:p>
-                      <a:endParaRPr lang="en-US" sz="300"/>
-                    </a:p>
-                  </a:txBody>
-                  <a:tcPr marL="16513" marR="16513" marT="8257" marB="8257"/>
-                </a:tc>
-                <a:tc>
-                  <a:txBody>
-                    <a:bodyPr/>
-                    <a:lstStyle/>
-                    <a:p>
-                      <a:endParaRPr lang="en-US" sz="300"/>
-                    </a:p>
-                  </a:txBody>
-                  <a:tcPr marL="16513" marR="16513" marT="8257" marB="8257"/>
-                </a:tc>
-                <a:tc>
-                  <a:txBody>
-                    <a:bodyPr/>
-                    <a:lstStyle/>
-                    <a:p>
-                      <a:endParaRPr lang="en-US" sz="300"/>
-                    </a:p>
-                  </a:txBody>
-                  <a:tcPr marL="16513" marR="16513" marT="8257" marB="8257">
-                    <a:lnR w="12700" cap="flat" cmpd="sng" algn="ctr">
-                      <a:solidFill>
-                        <a:schemeClr val="accent1"/>
-                      </a:solidFill>
-                      <a:prstDash val="solid"/>
-                      <a:round/>
-                      <a:headEnd type="none" w="med" len="med"/>
-                      <a:tailEnd type="none" w="med" len="med"/>
-                    </a:lnR>
-                  </a:tcPr>
-                </a:tc>
-                <a:extLst>
-                  <a:ext uri="{0D108BD9-81ED-4DB2-BD59-A6C34878D82A}">
-                    <a16:rowId xmlns:a16="http://schemas.microsoft.com/office/drawing/2014/main" val="1244738521"/>
-                  </a:ext>
-                </a:extLst>
-              </a:tr>
-              <a:tr h="66970">
-                <a:tc>
-                  <a:txBody>
-                    <a:bodyPr/>
-                    <a:lstStyle/>
-                    <a:p>
-                      <a:endParaRPr lang="en-US" sz="300"/>
-                    </a:p>
-                  </a:txBody>
-                  <a:tcPr marL="16513" marR="16513" marT="8257" marB="8257">
-                    <a:lnL w="12700" cap="flat" cmpd="sng" algn="ctr">
-                      <a:solidFill>
-                        <a:schemeClr val="accent1"/>
-                      </a:solidFill>
-                      <a:prstDash val="solid"/>
-                      <a:round/>
-                      <a:headEnd type="none" w="med" len="med"/>
-                      <a:tailEnd type="none" w="med" len="med"/>
-                    </a:lnL>
-                  </a:tcPr>
-                </a:tc>
-                <a:tc>
-                  <a:txBody>
-                    <a:bodyPr/>
-                    <a:lstStyle/>
-                    <a:p>
-                      <a:endParaRPr lang="en-US" sz="300"/>
-                    </a:p>
-                  </a:txBody>
-                  <a:tcPr marL="16513" marR="16513" marT="8257" marB="8257"/>
-                </a:tc>
-                <a:tc>
-                  <a:txBody>
-                    <a:bodyPr/>
-                    <a:lstStyle/>
-                    <a:p>
-                      <a:endParaRPr lang="en-US" sz="300"/>
-                    </a:p>
-                  </a:txBody>
-                  <a:tcPr marL="16513" marR="16513" marT="8257" marB="8257"/>
-                </a:tc>
-                <a:tc>
-                  <a:txBody>
-                    <a:bodyPr/>
-                    <a:lstStyle/>
-                    <a:p>
-                      <a:endParaRPr lang="en-US" sz="300"/>
-                    </a:p>
-                  </a:txBody>
-                  <a:tcPr marL="16513" marR="16513" marT="8257" marB="8257"/>
-                </a:tc>
-                <a:tc>
-                  <a:txBody>
-                    <a:bodyPr/>
-                    <a:lstStyle/>
-                    <a:p>
-                      <a:endParaRPr lang="en-US" sz="300" dirty="0"/>
-                    </a:p>
-                  </a:txBody>
-                  <a:tcPr marL="16513" marR="16513" marT="8257" marB="8257"/>
-                </a:tc>
-                <a:tc>
-                  <a:txBody>
-                    <a:bodyPr/>
-                    <a:lstStyle/>
-                    <a:p>
-                      <a:endParaRPr lang="en-US" sz="300"/>
-                    </a:p>
-                  </a:txBody>
-                  <a:tcPr marL="16513" marR="16513" marT="8257" marB="8257"/>
-                </a:tc>
-                <a:tc>
-                  <a:txBody>
-                    <a:bodyPr/>
-                    <a:lstStyle/>
-                    <a:p>
-                      <a:endParaRPr lang="en-US" sz="300"/>
-                    </a:p>
-                  </a:txBody>
-                  <a:tcPr marL="16513" marR="16513" marT="8257" marB="8257">
-                    <a:lnR w="12700" cap="flat" cmpd="sng" algn="ctr">
-                      <a:solidFill>
-                        <a:schemeClr val="accent1"/>
-                      </a:solidFill>
-                      <a:prstDash val="solid"/>
-                      <a:round/>
-                      <a:headEnd type="none" w="med" len="med"/>
-                      <a:tailEnd type="none" w="med" len="med"/>
-                    </a:lnR>
-                  </a:tcPr>
-                </a:tc>
-                <a:extLst>
-                  <a:ext uri="{0D108BD9-81ED-4DB2-BD59-A6C34878D82A}">
-                    <a16:rowId xmlns:a16="http://schemas.microsoft.com/office/drawing/2014/main" val="2846293047"/>
-                  </a:ext>
-                </a:extLst>
-              </a:tr>
-              <a:tr h="66970">
-                <a:tc>
-                  <a:txBody>
-                    <a:bodyPr/>
-                    <a:lstStyle/>
-                    <a:p>
-                      <a:endParaRPr lang="en-US" sz="300"/>
-                    </a:p>
-                  </a:txBody>
-                  <a:tcPr marL="16513" marR="16513" marT="8257" marB="8257">
-                    <a:lnL w="12700" cap="flat" cmpd="sng" algn="ctr">
-                      <a:solidFill>
-                        <a:schemeClr val="accent1"/>
-                      </a:solidFill>
-                      <a:prstDash val="solid"/>
-                      <a:round/>
-                      <a:headEnd type="none" w="med" len="med"/>
-                      <a:tailEnd type="none" w="med" len="med"/>
-                    </a:lnL>
-                  </a:tcPr>
-                </a:tc>
-                <a:tc>
-                  <a:txBody>
-                    <a:bodyPr/>
-                    <a:lstStyle/>
-                    <a:p>
-                      <a:endParaRPr lang="en-US" sz="300"/>
-                    </a:p>
-                  </a:txBody>
-                  <a:tcPr marL="16513" marR="16513" marT="8257" marB="8257"/>
-                </a:tc>
-                <a:tc>
-                  <a:txBody>
-                    <a:bodyPr/>
-                    <a:lstStyle/>
-                    <a:p>
-                      <a:endParaRPr lang="en-US" sz="300"/>
-                    </a:p>
-                  </a:txBody>
-                  <a:tcPr marL="16513" marR="16513" marT="8257" marB="8257"/>
-                </a:tc>
-                <a:tc>
-                  <a:txBody>
-                    <a:bodyPr/>
-                    <a:lstStyle/>
-                    <a:p>
-                      <a:endParaRPr lang="en-US" sz="300"/>
-                    </a:p>
-                  </a:txBody>
-                  <a:tcPr marL="16513" marR="16513" marT="8257" marB="8257"/>
-                </a:tc>
-                <a:tc>
-                  <a:txBody>
-                    <a:bodyPr/>
-                    <a:lstStyle/>
-                    <a:p>
-                      <a:endParaRPr lang="en-US" sz="300"/>
-                    </a:p>
-                  </a:txBody>
-                  <a:tcPr marL="16513" marR="16513" marT="8257" marB="8257"/>
-                </a:tc>
-                <a:tc>
-                  <a:txBody>
-                    <a:bodyPr/>
-                    <a:lstStyle/>
-                    <a:p>
-                      <a:endParaRPr lang="en-US" sz="300"/>
-                    </a:p>
-                  </a:txBody>
-                  <a:tcPr marL="16513" marR="16513" marT="8257" marB="8257"/>
-                </a:tc>
-                <a:tc>
-                  <a:txBody>
-                    <a:bodyPr/>
-                    <a:lstStyle/>
-                    <a:p>
-                      <a:endParaRPr lang="en-US" sz="300"/>
-                    </a:p>
-                  </a:txBody>
-                  <a:tcPr marL="16513" marR="16513" marT="8257" marB="8257">
-                    <a:lnR w="12700" cap="flat" cmpd="sng" algn="ctr">
-                      <a:solidFill>
-                        <a:schemeClr val="accent1"/>
-                      </a:solidFill>
-                      <a:prstDash val="solid"/>
-                      <a:round/>
-                      <a:headEnd type="none" w="med" len="med"/>
-                      <a:tailEnd type="none" w="med" len="med"/>
-                    </a:lnR>
-                  </a:tcPr>
-                </a:tc>
-                <a:extLst>
-                  <a:ext uri="{0D108BD9-81ED-4DB2-BD59-A6C34878D82A}">
-                    <a16:rowId xmlns:a16="http://schemas.microsoft.com/office/drawing/2014/main" val="379130267"/>
-                  </a:ext>
-                </a:extLst>
-              </a:tr>
-              <a:tr h="66970">
-                <a:tc>
-                  <a:txBody>
-                    <a:bodyPr/>
-                    <a:lstStyle/>
-                    <a:p>
-                      <a:endParaRPr lang="en-US" sz="300"/>
-                    </a:p>
-                  </a:txBody>
-                  <a:tcPr marL="16513" marR="16513" marT="8257" marB="8257">
-                    <a:lnL w="12700" cap="flat" cmpd="sng" algn="ctr">
-                      <a:solidFill>
-                        <a:schemeClr val="accent1"/>
-                      </a:solidFill>
-                      <a:prstDash val="solid"/>
-                      <a:round/>
-                      <a:headEnd type="none" w="med" len="med"/>
-                      <a:tailEnd type="none" w="med" len="med"/>
-                    </a:lnL>
-                    <a:lnB w="12700" cap="flat" cmpd="sng" algn="ctr">
-                      <a:solidFill>
-                        <a:schemeClr val="accent1"/>
-                      </a:solidFill>
-                      <a:prstDash val="solid"/>
-                      <a:round/>
-                      <a:headEnd type="none" w="med" len="med"/>
-                      <a:tailEnd type="none" w="med" len="med"/>
-                    </a:lnB>
-                  </a:tcPr>
-                </a:tc>
-                <a:tc>
-                  <a:txBody>
-                    <a:bodyPr/>
-                    <a:lstStyle/>
-                    <a:p>
-                      <a:endParaRPr lang="en-US" sz="300"/>
-                    </a:p>
-                  </a:txBody>
-                  <a:tcPr marL="16513" marR="16513" marT="8257" marB="8257">
-                    <a:lnB w="12700" cap="flat" cmpd="sng" algn="ctr">
-                      <a:solidFill>
-                        <a:schemeClr val="accent1"/>
-                      </a:solidFill>
-                      <a:prstDash val="solid"/>
-                      <a:round/>
-                      <a:headEnd type="none" w="med" len="med"/>
-                      <a:tailEnd type="none" w="med" len="med"/>
-                    </a:lnB>
-                  </a:tcPr>
-                </a:tc>
-                <a:tc>
-                  <a:txBody>
-                    <a:bodyPr/>
-                    <a:lstStyle/>
-                    <a:p>
-                      <a:endParaRPr lang="en-US" sz="300"/>
-                    </a:p>
-                  </a:txBody>
-                  <a:tcPr marL="16513" marR="16513" marT="8257" marB="8257">
-                    <a:lnB w="12700" cap="flat" cmpd="sng" algn="ctr">
-                      <a:solidFill>
-                        <a:schemeClr val="accent1"/>
-                      </a:solidFill>
-                      <a:prstDash val="solid"/>
-                      <a:round/>
-                      <a:headEnd type="none" w="med" len="med"/>
-                      <a:tailEnd type="none" w="med" len="med"/>
-                    </a:lnB>
-                  </a:tcPr>
-                </a:tc>
-                <a:tc>
-                  <a:txBody>
-                    <a:bodyPr/>
-                    <a:lstStyle/>
-                    <a:p>
-                      <a:endParaRPr lang="en-US" sz="300"/>
-                    </a:p>
-                  </a:txBody>
-                  <a:tcPr marL="16513" marR="16513" marT="8257" marB="8257">
-                    <a:lnB w="12700" cap="flat" cmpd="sng" algn="ctr">
-                      <a:solidFill>
-                        <a:schemeClr val="accent1"/>
-                      </a:solidFill>
-                      <a:prstDash val="solid"/>
-                      <a:round/>
-                      <a:headEnd type="none" w="med" len="med"/>
-                      <a:tailEnd type="none" w="med" len="med"/>
-                    </a:lnB>
-                  </a:tcPr>
-                </a:tc>
-                <a:tc>
-                  <a:txBody>
-                    <a:bodyPr/>
-                    <a:lstStyle/>
-                    <a:p>
-                      <a:endParaRPr lang="en-US" sz="300"/>
-                    </a:p>
-                  </a:txBody>
-                  <a:tcPr marL="16513" marR="16513" marT="8257" marB="8257">
-                    <a:lnB w="12700" cap="flat" cmpd="sng" algn="ctr">
-                      <a:solidFill>
-                        <a:schemeClr val="accent1"/>
-                      </a:solidFill>
-                      <a:prstDash val="solid"/>
-                      <a:round/>
-                      <a:headEnd type="none" w="med" len="med"/>
-                      <a:tailEnd type="none" w="med" len="med"/>
-                    </a:lnB>
-                  </a:tcPr>
-                </a:tc>
-                <a:tc>
-                  <a:txBody>
-                    <a:bodyPr/>
-                    <a:lstStyle/>
-                    <a:p>
-                      <a:endParaRPr lang="en-US" sz="300"/>
-                    </a:p>
-                  </a:txBody>
-                  <a:tcPr marL="16513" marR="16513" marT="8257" marB="8257">
-                    <a:lnB w="12700" cap="flat" cmpd="sng" algn="ctr">
-                      <a:solidFill>
-                        <a:schemeClr val="accent1"/>
-                      </a:solidFill>
-                      <a:prstDash val="solid"/>
-                      <a:round/>
-                      <a:headEnd type="none" w="med" len="med"/>
-                      <a:tailEnd type="none" w="med" len="med"/>
-                    </a:lnB>
-                  </a:tcPr>
-                </a:tc>
-                <a:tc>
-                  <a:txBody>
-                    <a:bodyPr/>
-                    <a:lstStyle/>
-                    <a:p>
-                      <a:endParaRPr lang="en-US" sz="300" dirty="0"/>
-                    </a:p>
-                  </a:txBody>
-                  <a:tcPr marL="16513" marR="16513" marT="8257" marB="8257">
-                    <a:lnR w="12700" cap="flat" cmpd="sng" algn="ctr">
-                      <a:solidFill>
-                        <a:schemeClr val="accent1"/>
-                      </a:solidFill>
-                      <a:prstDash val="solid"/>
-                      <a:round/>
-                      <a:headEnd type="none" w="med" len="med"/>
-                      <a:tailEnd type="none" w="med" len="med"/>
-                    </a:lnR>
-                    <a:lnB w="12700" cap="flat" cmpd="sng" algn="ctr">
-                      <a:solidFill>
-                        <a:schemeClr val="accent1"/>
-                      </a:solidFill>
-                      <a:prstDash val="solid"/>
-                      <a:round/>
-                      <a:headEnd type="none" w="med" len="med"/>
-                      <a:tailEnd type="none" w="med" len="med"/>
-                    </a:lnB>
-                  </a:tcPr>
-                </a:tc>
-                <a:extLst>
-                  <a:ext uri="{0D108BD9-81ED-4DB2-BD59-A6C34878D82A}">
-                    <a16:rowId xmlns:a16="http://schemas.microsoft.com/office/drawing/2014/main" val="3116162638"/>
-                  </a:ext>
-                </a:extLst>
-              </a:tr>
-            </a:tbl>
-          </a:graphicData>
-        </a:graphic>
-      </p:graphicFrame>
-      <p:sp>
-        <p:nvSpPr>
-          <p:cNvPr id="43" name="TextBox 42">
-            <a:extLst>
-              <a:ext uri="{FF2B5EF4-FFF2-40B4-BE49-F238E27FC236}">
-                <a16:creationId xmlns:a16="http://schemas.microsoft.com/office/drawing/2014/main" id="{100BF56B-3B8F-4DDB-94CB-116F2363D568}"/>
-              </a:ext>
-            </a:extLst>
-          </p:cNvPr>
-          <p:cNvSpPr txBox="1"/>
-          <p:nvPr/>
-        </p:nvSpPr>
-        <p:spPr>
-          <a:xfrm>
-            <a:off x="125022" y="352933"/>
-            <a:ext cx="1451552" cy="369335"/>
-          </a:xfrm>
-          <a:prstGeom prst="rect">
-            <a:avLst/>
-          </a:prstGeom>
-          <a:noFill/>
-        </p:spPr>
-        <p:txBody>
-          <a:bodyPr wrap="square" rtlCol="0">
-            <a:spAutoFit/>
-          </a:bodyPr>
-          <a:lstStyle/>
-          <a:p>
-            <a:r>
-              <a:rPr lang="en-US" dirty="0"/>
-              <a:t>Apr 17, 2018</a:t>
-            </a:r>
-          </a:p>
-        </p:txBody>
-      </p:sp>
-      <p:sp>
-        <p:nvSpPr>
-          <p:cNvPr id="58" name="Isosceles Triangle 57">
-            <a:extLst>
-              <a:ext uri="{FF2B5EF4-FFF2-40B4-BE49-F238E27FC236}">
-                <a16:creationId xmlns:a16="http://schemas.microsoft.com/office/drawing/2014/main" id="{72F5771A-CF22-42D0-BC1E-20633B5F4B1F}"/>
-              </a:ext>
-            </a:extLst>
-          </p:cNvPr>
-          <p:cNvSpPr/>
-          <p:nvPr/>
-        </p:nvSpPr>
-        <p:spPr>
-          <a:xfrm rot="5400000">
-            <a:off x="4733474" y="4911875"/>
-            <a:ext cx="201292" cy="173528"/>
-          </a:xfrm>
-          <a:prstGeom prst="triangle">
-            <a:avLst/>
-          </a:prstGeom>
-          <a:solidFill>
-            <a:schemeClr val="tx1"/>
-          </a:solidFill>
-          <a:ln>
-            <a:solidFill>
-              <a:schemeClr val="tx1"/>
-            </a:solidFill>
-          </a:ln>
-        </p:spPr>
-        <p:style>
-          <a:lnRef idx="2">
-            <a:schemeClr val="accent1">
-              <a:shade val="50000"/>
-            </a:schemeClr>
-          </a:lnRef>
-          <a:fillRef idx="1">
-            <a:schemeClr val="accent1"/>
-          </a:fillRef>
-          <a:effectRef idx="0">
-            <a:schemeClr val="accent1"/>
-          </a:effectRef>
-          <a:fontRef idx="minor">
-            <a:schemeClr val="lt1"/>
-          </a:fontRef>
-        </p:style>
-        <p:txBody>
-          <a:bodyPr rtlCol="0" anchor="ctr"/>
-          <a:lstStyle/>
-          <a:p>
-            <a:pPr algn="ctr"/>
-            <a:endParaRPr lang="en-US"/>
-          </a:p>
-        </p:txBody>
-      </p:sp>
-      <p:sp>
-        <p:nvSpPr>
-          <p:cNvPr id="22" name="TextBox 21">
-            <a:extLst>
-              <a:ext uri="{FF2B5EF4-FFF2-40B4-BE49-F238E27FC236}">
-                <a16:creationId xmlns:a16="http://schemas.microsoft.com/office/drawing/2014/main" id="{490394CC-015F-46B9-92A7-C6D119FD0D0D}"/>
-              </a:ext>
-            </a:extLst>
-          </p:cNvPr>
-          <p:cNvSpPr txBox="1"/>
-          <p:nvPr/>
-        </p:nvSpPr>
-        <p:spPr>
-          <a:xfrm>
-            <a:off x="10387651" y="808709"/>
-            <a:ext cx="1499669" cy="1200329"/>
-          </a:xfrm>
-          <a:prstGeom prst="rect">
-            <a:avLst/>
-          </a:prstGeom>
-          <a:solidFill>
-            <a:schemeClr val="bg1"/>
-          </a:solidFill>
-          <a:ln>
-            <a:solidFill>
-              <a:schemeClr val="bg1">
-                <a:lumMod val="75000"/>
-              </a:schemeClr>
-            </a:solidFill>
-          </a:ln>
-        </p:spPr>
-        <p:txBody>
-          <a:bodyPr wrap="square" rtlCol="0">
-            <a:spAutoFit/>
-          </a:bodyPr>
-          <a:lstStyle/>
-          <a:p>
-            <a:r>
-              <a:rPr lang="en-US" dirty="0"/>
-              <a:t>Account Info</a:t>
-            </a:r>
-          </a:p>
-          <a:p>
-            <a:r>
-              <a:rPr lang="en-US" dirty="0"/>
-              <a:t>History</a:t>
-            </a:r>
-          </a:p>
-          <a:p>
-            <a:r>
-              <a:rPr lang="en-US" dirty="0"/>
-              <a:t>Quizzes</a:t>
-            </a:r>
-          </a:p>
-          <a:p>
-            <a:r>
-              <a:rPr lang="en-US" dirty="0"/>
-              <a:t>Sign Out</a:t>
-            </a:r>
-          </a:p>
-        </p:txBody>
-      </p:sp>
     </p:spTree>
     <p:extLst>
       <p:ext uri="{BB962C8B-B14F-4D97-AF65-F5344CB8AC3E}">
-        <p14:creationId xmlns:p14="http://schemas.microsoft.com/office/powerpoint/2010/main" val="2613338930"/>
+        <p14:creationId xmlns:p14="http://schemas.microsoft.com/office/powerpoint/2010/main" val="2809235449"/>
       </p:ext>
     </p:extLst>
   </p:cSld>

</xml_diff>